<commit_message>
[docs] update document chapter
update document chapter
</commit_message>
<xml_diff>
--- a/docs/phase2/03_vulnerabilities/vulnerabilities.pptx
+++ b/docs/phase2/03_vulnerabilities/vulnerabilities.pptx
@@ -106,6 +106,11 @@
       </a:defRPr>
     </a:lvl9pPr>
   </p:defaultTextStyle>
+  <p:extLst>
+    <p:ext uri="{EFAFB233-063F-42B5-8137-9DF3F51BA10A}">
+      <p15:sldGuideLst xmlns:p15="http://schemas.microsoft.com/office/powerpoint/2012/main"/>
+    </p:ext>
+  </p:extLst>
 </p:presentation>
 </file>
 
@@ -240,7 +245,7 @@
           <a:p>
             <a:fld id="{EED842B6-D859-4B1F-9D5F-9C3078C10B9B}" type="datetimeFigureOut">
               <a:rPr lang="ko-KR" altLang="en-US" smtClean="0"/>
-              <a:t>2021-06-28</a:t>
+              <a:t>2021-06-29</a:t>
             </a:fld>
             <a:endParaRPr lang="ko-KR" altLang="en-US"/>
           </a:p>
@@ -410,7 +415,7 @@
           <a:p>
             <a:fld id="{EED842B6-D859-4B1F-9D5F-9C3078C10B9B}" type="datetimeFigureOut">
               <a:rPr lang="ko-KR" altLang="en-US" smtClean="0"/>
-              <a:t>2021-06-28</a:t>
+              <a:t>2021-06-29</a:t>
             </a:fld>
             <a:endParaRPr lang="ko-KR" altLang="en-US"/>
           </a:p>
@@ -590,7 +595,7 @@
           <a:p>
             <a:fld id="{EED842B6-D859-4B1F-9D5F-9C3078C10B9B}" type="datetimeFigureOut">
               <a:rPr lang="ko-KR" altLang="en-US" smtClean="0"/>
-              <a:t>2021-06-28</a:t>
+              <a:t>2021-06-29</a:t>
             </a:fld>
             <a:endParaRPr lang="ko-KR" altLang="en-US"/>
           </a:p>
@@ -760,7 +765,7 @@
           <a:p>
             <a:fld id="{EED842B6-D859-4B1F-9D5F-9C3078C10B9B}" type="datetimeFigureOut">
               <a:rPr lang="ko-KR" altLang="en-US" smtClean="0"/>
-              <a:t>2021-06-28</a:t>
+              <a:t>2021-06-29</a:t>
             </a:fld>
             <a:endParaRPr lang="ko-KR" altLang="en-US"/>
           </a:p>
@@ -1006,7 +1011,7 @@
           <a:p>
             <a:fld id="{EED842B6-D859-4B1F-9D5F-9C3078C10B9B}" type="datetimeFigureOut">
               <a:rPr lang="ko-KR" altLang="en-US" smtClean="0"/>
-              <a:t>2021-06-28</a:t>
+              <a:t>2021-06-29</a:t>
             </a:fld>
             <a:endParaRPr lang="ko-KR" altLang="en-US"/>
           </a:p>
@@ -1238,7 +1243,7 @@
           <a:p>
             <a:fld id="{EED842B6-D859-4B1F-9D5F-9C3078C10B9B}" type="datetimeFigureOut">
               <a:rPr lang="ko-KR" altLang="en-US" smtClean="0"/>
-              <a:t>2021-06-28</a:t>
+              <a:t>2021-06-29</a:t>
             </a:fld>
             <a:endParaRPr lang="ko-KR" altLang="en-US"/>
           </a:p>
@@ -1605,7 +1610,7 @@
           <a:p>
             <a:fld id="{EED842B6-D859-4B1F-9D5F-9C3078C10B9B}" type="datetimeFigureOut">
               <a:rPr lang="ko-KR" altLang="en-US" smtClean="0"/>
-              <a:t>2021-06-28</a:t>
+              <a:t>2021-06-29</a:t>
             </a:fld>
             <a:endParaRPr lang="ko-KR" altLang="en-US"/>
           </a:p>
@@ -1723,7 +1728,7 @@
           <a:p>
             <a:fld id="{EED842B6-D859-4B1F-9D5F-9C3078C10B9B}" type="datetimeFigureOut">
               <a:rPr lang="ko-KR" altLang="en-US" smtClean="0"/>
-              <a:t>2021-06-28</a:t>
+              <a:t>2021-06-29</a:t>
             </a:fld>
             <a:endParaRPr lang="ko-KR" altLang="en-US"/>
           </a:p>
@@ -1818,7 +1823,7 @@
           <a:p>
             <a:fld id="{EED842B6-D859-4B1F-9D5F-9C3078C10B9B}" type="datetimeFigureOut">
               <a:rPr lang="ko-KR" altLang="en-US" smtClean="0"/>
-              <a:t>2021-06-28</a:t>
+              <a:t>2021-06-29</a:t>
             </a:fld>
             <a:endParaRPr lang="ko-KR" altLang="en-US"/>
           </a:p>
@@ -2095,7 +2100,7 @@
           <a:p>
             <a:fld id="{EED842B6-D859-4B1F-9D5F-9C3078C10B9B}" type="datetimeFigureOut">
               <a:rPr lang="ko-KR" altLang="en-US" smtClean="0"/>
-              <a:t>2021-06-28</a:t>
+              <a:t>2021-06-29</a:t>
             </a:fld>
             <a:endParaRPr lang="ko-KR" altLang="en-US"/>
           </a:p>
@@ -2348,7 +2353,7 @@
           <a:p>
             <a:fld id="{EED842B6-D859-4B1F-9D5F-9C3078C10B9B}" type="datetimeFigureOut">
               <a:rPr lang="ko-KR" altLang="en-US" smtClean="0"/>
-              <a:t>2021-06-28</a:t>
+              <a:t>2021-06-29</a:t>
             </a:fld>
             <a:endParaRPr lang="ko-KR" altLang="en-US"/>
           </a:p>
@@ -2561,7 +2566,7 @@
           <a:p>
             <a:fld id="{EED842B6-D859-4B1F-9D5F-9C3078C10B9B}" type="datetimeFigureOut">
               <a:rPr lang="ko-KR" altLang="en-US" smtClean="0"/>
-              <a:t>2021-06-28</a:t>
+              <a:t>2021-06-29</a:t>
             </a:fld>
             <a:endParaRPr lang="ko-KR" altLang="en-US"/>
           </a:p>
@@ -5229,7 +5234,7 @@
           <p:cNvPr id="46" name="Google Shape;214;p55">
             <a:extLst>
               <a:ext uri="{FF2B5EF4-FFF2-40B4-BE49-F238E27FC236}">
-                <a16:creationId xmlns:a16="http://schemas.microsoft.com/office/drawing/2014/main" xmlns="" id="{DFFA0191-9961-4516-859A-604700977967}"/>
+                <a16:creationId xmlns="" xmlns:a16="http://schemas.microsoft.com/office/drawing/2014/main" id="{DFFA0191-9961-4516-859A-604700977967}"/>
               </a:ext>
             </a:extLst>
           </p:cNvPr>
@@ -5311,7 +5316,7 @@
           <p:cNvPr id="47" name="Google Shape;233;p55">
             <a:extLst>
               <a:ext uri="{FF2B5EF4-FFF2-40B4-BE49-F238E27FC236}">
-                <a16:creationId xmlns:a16="http://schemas.microsoft.com/office/drawing/2014/main" xmlns="" id="{08CF8F02-18B1-4A1B-8B92-8E56F353534D}"/>
+                <a16:creationId xmlns="" xmlns:a16="http://schemas.microsoft.com/office/drawing/2014/main" id="{08CF8F02-18B1-4A1B-8B92-8E56F353534D}"/>
               </a:ext>
             </a:extLst>
           </p:cNvPr>
@@ -5343,7 +5348,7 @@
           <p:cNvPr id="48" name="Google Shape;219;p55">
             <a:extLst>
               <a:ext uri="{FF2B5EF4-FFF2-40B4-BE49-F238E27FC236}">
-                <a16:creationId xmlns:a16="http://schemas.microsoft.com/office/drawing/2014/main" xmlns="" id="{FB8D6E94-6508-4EDE-9C03-75702AA75FDE}"/>
+                <a16:creationId xmlns="" xmlns:a16="http://schemas.microsoft.com/office/drawing/2014/main" id="{FB8D6E94-6508-4EDE-9C03-75702AA75FDE}"/>
               </a:ext>
             </a:extLst>
           </p:cNvPr>
@@ -7663,7 +7668,7 @@
           <p:cNvPr id="46" name="Google Shape;214;p55">
             <a:extLst>
               <a:ext uri="{FF2B5EF4-FFF2-40B4-BE49-F238E27FC236}">
-                <a16:creationId xmlns:a16="http://schemas.microsoft.com/office/drawing/2014/main" xmlns="" id="{DFFA0191-9961-4516-859A-604700977967}"/>
+                <a16:creationId xmlns="" xmlns:a16="http://schemas.microsoft.com/office/drawing/2014/main" id="{DFFA0191-9961-4516-859A-604700977967}"/>
               </a:ext>
             </a:extLst>
           </p:cNvPr>
@@ -7745,7 +7750,7 @@
           <p:cNvPr id="47" name="Google Shape;233;p55">
             <a:extLst>
               <a:ext uri="{FF2B5EF4-FFF2-40B4-BE49-F238E27FC236}">
-                <a16:creationId xmlns:a16="http://schemas.microsoft.com/office/drawing/2014/main" xmlns="" id="{08CF8F02-18B1-4A1B-8B92-8E56F353534D}"/>
+                <a16:creationId xmlns="" xmlns:a16="http://schemas.microsoft.com/office/drawing/2014/main" id="{08CF8F02-18B1-4A1B-8B92-8E56F353534D}"/>
               </a:ext>
             </a:extLst>
           </p:cNvPr>
@@ -7777,7 +7782,7 @@
           <p:cNvPr id="48" name="Google Shape;219;p55">
             <a:extLst>
               <a:ext uri="{FF2B5EF4-FFF2-40B4-BE49-F238E27FC236}">
-                <a16:creationId xmlns:a16="http://schemas.microsoft.com/office/drawing/2014/main" xmlns="" id="{FB8D6E94-6508-4EDE-9C03-75702AA75FDE}"/>
+                <a16:creationId xmlns="" xmlns:a16="http://schemas.microsoft.com/office/drawing/2014/main" id="{FB8D6E94-6508-4EDE-9C03-75702AA75FDE}"/>
               </a:ext>
             </a:extLst>
           </p:cNvPr>
@@ -7809,7 +7814,7 @@
           <p:cNvPr id="51" name="타원 50">
             <a:extLst>
               <a:ext uri="{FF2B5EF4-FFF2-40B4-BE49-F238E27FC236}">
-                <a16:creationId xmlns:a16="http://schemas.microsoft.com/office/drawing/2014/main" xmlns="" id="{8F2D1BDA-23B8-4349-8984-BE1B4BD4CD68}"/>
+                <a16:creationId xmlns="" xmlns:a16="http://schemas.microsoft.com/office/drawing/2014/main" id="{8F2D1BDA-23B8-4349-8984-BE1B4BD4CD68}"/>
               </a:ext>
             </a:extLst>
           </p:cNvPr>
@@ -7877,7 +7882,7 @@
           <p:cNvPr id="52" name="타원 51">
             <a:extLst>
               <a:ext uri="{FF2B5EF4-FFF2-40B4-BE49-F238E27FC236}">
-                <a16:creationId xmlns:a16="http://schemas.microsoft.com/office/drawing/2014/main" xmlns="" id="{214527EA-3F5E-4A77-AA8B-A562C5B0F6C2}"/>
+                <a16:creationId xmlns="" xmlns:a16="http://schemas.microsoft.com/office/drawing/2014/main" id="{214527EA-3F5E-4A77-AA8B-A562C5B0F6C2}"/>
               </a:ext>
             </a:extLst>
           </p:cNvPr>
@@ -7945,7 +7950,7 @@
           <p:cNvPr id="53" name="타원 52">
             <a:extLst>
               <a:ext uri="{FF2B5EF4-FFF2-40B4-BE49-F238E27FC236}">
-                <a16:creationId xmlns:a16="http://schemas.microsoft.com/office/drawing/2014/main" xmlns="" id="{BD37F2FA-E8CD-47F0-B041-42281CBBD1D5}"/>
+                <a16:creationId xmlns="" xmlns:a16="http://schemas.microsoft.com/office/drawing/2014/main" id="{BD37F2FA-E8CD-47F0-B041-42281CBBD1D5}"/>
               </a:ext>
             </a:extLst>
           </p:cNvPr>
@@ -8013,7 +8018,7 @@
           <p:cNvPr id="54" name="타원 53">
             <a:extLst>
               <a:ext uri="{FF2B5EF4-FFF2-40B4-BE49-F238E27FC236}">
-                <a16:creationId xmlns:a16="http://schemas.microsoft.com/office/drawing/2014/main" xmlns="" id="{AFCD2F96-5CAE-4D55-9CC1-0C2A73C51C9D}"/>
+                <a16:creationId xmlns="" xmlns:a16="http://schemas.microsoft.com/office/drawing/2014/main" id="{AFCD2F96-5CAE-4D55-9CC1-0C2A73C51C9D}"/>
               </a:ext>
             </a:extLst>
           </p:cNvPr>
@@ -8081,7 +8086,7 @@
           <p:cNvPr id="57" name="타원 56">
             <a:extLst>
               <a:ext uri="{FF2B5EF4-FFF2-40B4-BE49-F238E27FC236}">
-                <a16:creationId xmlns:a16="http://schemas.microsoft.com/office/drawing/2014/main" xmlns="" id="{79C1EAE1-FF6A-457D-B34B-58B6205BD145}"/>
+                <a16:creationId xmlns="" xmlns:a16="http://schemas.microsoft.com/office/drawing/2014/main" id="{79C1EAE1-FF6A-457D-B34B-58B6205BD145}"/>
               </a:ext>
             </a:extLst>
           </p:cNvPr>
@@ -8149,7 +8154,7 @@
           <p:cNvPr id="58" name="타원 57">
             <a:extLst>
               <a:ext uri="{FF2B5EF4-FFF2-40B4-BE49-F238E27FC236}">
-                <a16:creationId xmlns:a16="http://schemas.microsoft.com/office/drawing/2014/main" xmlns="" id="{D3BF1A94-9942-40EE-9FC7-1FC2D6573A24}"/>
+                <a16:creationId xmlns="" xmlns:a16="http://schemas.microsoft.com/office/drawing/2014/main" id="{D3BF1A94-9942-40EE-9FC7-1FC2D6573A24}"/>
               </a:ext>
             </a:extLst>
           </p:cNvPr>
@@ -8217,7 +8222,7 @@
           <p:cNvPr id="59" name="타원 58">
             <a:extLst>
               <a:ext uri="{FF2B5EF4-FFF2-40B4-BE49-F238E27FC236}">
-                <a16:creationId xmlns:a16="http://schemas.microsoft.com/office/drawing/2014/main" xmlns="" id="{290C5C0B-6FF7-47DE-AA13-1D7BA72EEACD}"/>
+                <a16:creationId xmlns="" xmlns:a16="http://schemas.microsoft.com/office/drawing/2014/main" id="{290C5C0B-6FF7-47DE-AA13-1D7BA72EEACD}"/>
               </a:ext>
             </a:extLst>
           </p:cNvPr>
@@ -8285,7 +8290,7 @@
           <p:cNvPr id="60" name="타원 59">
             <a:extLst>
               <a:ext uri="{FF2B5EF4-FFF2-40B4-BE49-F238E27FC236}">
-                <a16:creationId xmlns:a16="http://schemas.microsoft.com/office/drawing/2014/main" xmlns="" id="{C88302A2-9351-4F02-B76E-00161A78BDBA}"/>
+                <a16:creationId xmlns="" xmlns:a16="http://schemas.microsoft.com/office/drawing/2014/main" id="{C88302A2-9351-4F02-B76E-00161A78BDBA}"/>
               </a:ext>
             </a:extLst>
           </p:cNvPr>
@@ -8353,7 +8358,7 @@
           <p:cNvPr id="61" name="타원 60">
             <a:extLst>
               <a:ext uri="{FF2B5EF4-FFF2-40B4-BE49-F238E27FC236}">
-                <a16:creationId xmlns:a16="http://schemas.microsoft.com/office/drawing/2014/main" xmlns="" id="{AF6CE26B-897D-48B0-B910-084056A7C677}"/>
+                <a16:creationId xmlns="" xmlns:a16="http://schemas.microsoft.com/office/drawing/2014/main" id="{AF6CE26B-897D-48B0-B910-084056A7C677}"/>
               </a:ext>
             </a:extLst>
           </p:cNvPr>
@@ -8421,7 +8426,7 @@
           <p:cNvPr id="63" name="타원 62">
             <a:extLst>
               <a:ext uri="{FF2B5EF4-FFF2-40B4-BE49-F238E27FC236}">
-                <a16:creationId xmlns:a16="http://schemas.microsoft.com/office/drawing/2014/main" xmlns="" id="{2176C940-B3F5-4781-A426-FE55D18A29BD}"/>
+                <a16:creationId xmlns="" xmlns:a16="http://schemas.microsoft.com/office/drawing/2014/main" id="{2176C940-B3F5-4781-A426-FE55D18A29BD}"/>
               </a:ext>
             </a:extLst>
           </p:cNvPr>
@@ -8430,7 +8435,7 @@
         </p:nvSpPr>
         <p:spPr>
           <a:xfrm>
-            <a:off x="6341531" y="5669337"/>
+            <a:off x="6341531" y="5629708"/>
             <a:ext cx="1020234" cy="476071"/>
           </a:xfrm>
           <a:prstGeom prst="ellipse">
@@ -8489,7 +8494,7 @@
           <p:cNvPr id="64" name="타원 63">
             <a:extLst>
               <a:ext uri="{FF2B5EF4-FFF2-40B4-BE49-F238E27FC236}">
-                <a16:creationId xmlns:a16="http://schemas.microsoft.com/office/drawing/2014/main" xmlns="" id="{7CE5C7E7-6196-4919-9E26-F786109572D0}"/>
+                <a16:creationId xmlns="" xmlns:a16="http://schemas.microsoft.com/office/drawing/2014/main" id="{7CE5C7E7-6196-4919-9E26-F786109572D0}"/>
               </a:ext>
             </a:extLst>
           </p:cNvPr>
@@ -8557,7 +8562,7 @@
           <p:cNvPr id="65" name="타원 64">
             <a:extLst>
               <a:ext uri="{FF2B5EF4-FFF2-40B4-BE49-F238E27FC236}">
-                <a16:creationId xmlns:a16="http://schemas.microsoft.com/office/drawing/2014/main" xmlns="" id="{1413D02F-4376-472C-B5B6-9D3FAE116D98}"/>
+                <a16:creationId xmlns="" xmlns:a16="http://schemas.microsoft.com/office/drawing/2014/main" id="{1413D02F-4376-472C-B5B6-9D3FAE116D98}"/>
               </a:ext>
             </a:extLst>
           </p:cNvPr>
@@ -10913,7 +10918,7 @@
           <p:cNvPr id="46" name="Google Shape;214;p55">
             <a:extLst>
               <a:ext uri="{FF2B5EF4-FFF2-40B4-BE49-F238E27FC236}">
-                <a16:creationId xmlns:a16="http://schemas.microsoft.com/office/drawing/2014/main" xmlns="" id="{DFFA0191-9961-4516-859A-604700977967}"/>
+                <a16:creationId xmlns="" xmlns:a16="http://schemas.microsoft.com/office/drawing/2014/main" id="{DFFA0191-9961-4516-859A-604700977967}"/>
               </a:ext>
             </a:extLst>
           </p:cNvPr>
@@ -10995,7 +11000,7 @@
           <p:cNvPr id="47" name="Google Shape;233;p55">
             <a:extLst>
               <a:ext uri="{FF2B5EF4-FFF2-40B4-BE49-F238E27FC236}">
-                <a16:creationId xmlns:a16="http://schemas.microsoft.com/office/drawing/2014/main" xmlns="" id="{08CF8F02-18B1-4A1B-8B92-8E56F353534D}"/>
+                <a16:creationId xmlns="" xmlns:a16="http://schemas.microsoft.com/office/drawing/2014/main" id="{08CF8F02-18B1-4A1B-8B92-8E56F353534D}"/>
               </a:ext>
             </a:extLst>
           </p:cNvPr>
@@ -11027,7 +11032,7 @@
           <p:cNvPr id="48" name="Google Shape;219;p55">
             <a:extLst>
               <a:ext uri="{FF2B5EF4-FFF2-40B4-BE49-F238E27FC236}">
-                <a16:creationId xmlns:a16="http://schemas.microsoft.com/office/drawing/2014/main" xmlns="" id="{FB8D6E94-6508-4EDE-9C03-75702AA75FDE}"/>
+                <a16:creationId xmlns="" xmlns:a16="http://schemas.microsoft.com/office/drawing/2014/main" id="{FB8D6E94-6508-4EDE-9C03-75702AA75FDE}"/>
               </a:ext>
             </a:extLst>
           </p:cNvPr>
@@ -11056,25 +11061,32 @@
       </p:cxnSp>
       <p:sp>
         <p:nvSpPr>
-          <p:cNvPr id="49" name="모서리가 둥근 사각형 설명선 48"/>
+          <p:cNvPr id="51" name="타원 50">
+            <a:extLst>
+              <a:ext uri="{FF2B5EF4-FFF2-40B4-BE49-F238E27FC236}">
+                <a16:creationId xmlns="" xmlns:a16="http://schemas.microsoft.com/office/drawing/2014/main" id="{8F2D1BDA-23B8-4349-8984-BE1B4BD4CD68}"/>
+              </a:ext>
+            </a:extLst>
+          </p:cNvPr>
           <p:cNvSpPr/>
           <p:nvPr/>
         </p:nvSpPr>
         <p:spPr>
           <a:xfrm>
-            <a:off x="6662231" y="3144466"/>
-            <a:ext cx="681488" cy="332235"/>
-          </a:xfrm>
-          <a:prstGeom prst="wedgeRoundRectCallout">
-            <a:avLst>
-              <a:gd name="adj1" fmla="val -14343"/>
-              <a:gd name="adj2" fmla="val -143870"/>
-              <a:gd name="adj3" fmla="val 16667"/>
-            </a:avLst>
+            <a:off x="5076380" y="1293305"/>
+            <a:ext cx="479394" cy="238036"/>
+          </a:xfrm>
+          <a:prstGeom prst="ellipse">
+            <a:avLst/>
           </a:prstGeom>
           <a:solidFill>
-            <a:srgbClr val="FF0000"/>
+            <a:srgbClr val="FFFF00"/>
           </a:solidFill>
+          <a:ln w="28575">
+            <a:solidFill>
+              <a:schemeClr val="tx1"/>
+            </a:solidFill>
+          </a:ln>
         </p:spPr>
         <p:style>
           <a:lnRef idx="2">
@@ -11093,39 +11105,56 @@
           </a:fontRef>
         </p:style>
         <p:txBody>
-          <a:bodyPr rtlCol="0" anchor="ctr"/>
+          <a:bodyPr lIns="0" tIns="0" rIns="0" bIns="0" rtlCol="0" anchor="ctr" anchorCtr="1">
+            <a:spAutoFit/>
+          </a:bodyPr>
           <a:lstStyle/>
           <a:p>
             <a:pPr algn="ctr"/>
             <a:r>
-              <a:rPr lang="en-US" altLang="ko-KR" sz="1000" b="1" dirty="0" smtClean="0"/>
-              <a:t>V02</a:t>
-            </a:r>
-            <a:endParaRPr lang="ko-KR" altLang="en-US" sz="1000" b="1"/>
-          </a:p>
-        </p:txBody>
-      </p:sp>
-      <p:sp>
-        <p:nvSpPr>
-          <p:cNvPr id="50" name="모서리가 둥근 사각형 설명선 49"/>
+              <a:rPr lang="en-US" altLang="ko-KR" sz="1100" b="1" dirty="0">
+                <a:solidFill>
+                  <a:srgbClr val="C00000"/>
+                </a:solidFill>
+              </a:rPr>
+              <a:t>SD2</a:t>
+            </a:r>
+            <a:endParaRPr lang="ko-KR" altLang="en-US" sz="1100" b="1" dirty="0">
+              <a:solidFill>
+                <a:srgbClr val="C00000"/>
+              </a:solidFill>
+            </a:endParaRPr>
+          </a:p>
+        </p:txBody>
+      </p:sp>
+      <p:sp>
+        <p:nvSpPr>
+          <p:cNvPr id="52" name="타원 51">
+            <a:extLst>
+              <a:ext uri="{FF2B5EF4-FFF2-40B4-BE49-F238E27FC236}">
+                <a16:creationId xmlns="" xmlns:a16="http://schemas.microsoft.com/office/drawing/2014/main" id="{214527EA-3F5E-4A77-AA8B-A562C5B0F6C2}"/>
+              </a:ext>
+            </a:extLst>
+          </p:cNvPr>
           <p:cNvSpPr/>
           <p:nvPr/>
         </p:nvSpPr>
         <p:spPr>
           <a:xfrm>
-            <a:off x="1894114" y="4806535"/>
-            <a:ext cx="731977" cy="332235"/>
-          </a:xfrm>
-          <a:prstGeom prst="wedgeRoundRectCallout">
-            <a:avLst>
-              <a:gd name="adj1" fmla="val 29470"/>
-              <a:gd name="adj2" fmla="val -141062"/>
-              <a:gd name="adj3" fmla="val 16667"/>
-            </a:avLst>
+            <a:off x="3816380" y="2223459"/>
+            <a:ext cx="479394" cy="238036"/>
+          </a:xfrm>
+          <a:prstGeom prst="ellipse">
+            <a:avLst/>
           </a:prstGeom>
           <a:solidFill>
-            <a:srgbClr val="FF0000"/>
+            <a:srgbClr val="FFFF00"/>
           </a:solidFill>
+          <a:ln w="28575">
+            <a:solidFill>
+              <a:schemeClr val="tx1"/>
+            </a:solidFill>
+          </a:ln>
         </p:spPr>
         <p:style>
           <a:lnRef idx="2">
@@ -11144,24 +11173,34 @@
           </a:fontRef>
         </p:style>
         <p:txBody>
-          <a:bodyPr rtlCol="0" anchor="ctr"/>
+          <a:bodyPr lIns="0" tIns="0" rIns="0" bIns="0" rtlCol="0" anchor="ctr" anchorCtr="1">
+            <a:spAutoFit/>
+          </a:bodyPr>
           <a:lstStyle/>
           <a:p>
             <a:pPr algn="ctr"/>
             <a:r>
-              <a:rPr lang="en-US" altLang="ko-KR" sz="1000" b="1" dirty="0" smtClean="0"/>
-              <a:t>V01,V09</a:t>
-            </a:r>
-            <a:endParaRPr lang="ko-KR" altLang="en-US" sz="1000" b="1"/>
-          </a:p>
-        </p:txBody>
-      </p:sp>
-      <p:sp>
-        <p:nvSpPr>
-          <p:cNvPr id="51" name="타원 50">
+              <a:rPr lang="en-US" altLang="ko-KR" sz="1100" b="1" dirty="0">
+                <a:solidFill>
+                  <a:srgbClr val="C00000"/>
+                </a:solidFill>
+              </a:rPr>
+              <a:t>SD4</a:t>
+            </a:r>
+            <a:endParaRPr lang="ko-KR" altLang="en-US" sz="1100" b="1" dirty="0">
+              <a:solidFill>
+                <a:srgbClr val="C00000"/>
+              </a:solidFill>
+            </a:endParaRPr>
+          </a:p>
+        </p:txBody>
+      </p:sp>
+      <p:sp>
+        <p:nvSpPr>
+          <p:cNvPr id="53" name="타원 52">
             <a:extLst>
               <a:ext uri="{FF2B5EF4-FFF2-40B4-BE49-F238E27FC236}">
-                <a16:creationId xmlns:a16="http://schemas.microsoft.com/office/drawing/2014/main" xmlns="" id="{8F2D1BDA-23B8-4349-8984-BE1B4BD4CD68}"/>
+                <a16:creationId xmlns="" xmlns:a16="http://schemas.microsoft.com/office/drawing/2014/main" id="{BD37F2FA-E8CD-47F0-B041-42281CBBD1D5}"/>
               </a:ext>
             </a:extLst>
           </p:cNvPr>
@@ -11170,7 +11209,7 @@
         </p:nvSpPr>
         <p:spPr>
           <a:xfrm>
-            <a:off x="5076380" y="1293305"/>
+            <a:off x="2637792" y="4142833"/>
             <a:ext cx="479394" cy="238036"/>
           </a:xfrm>
           <a:prstGeom prst="ellipse">
@@ -11214,7 +11253,7 @@
                   <a:srgbClr val="C00000"/>
                 </a:solidFill>
               </a:rPr>
-              <a:t>SD2</a:t>
+              <a:t>SD6</a:t>
             </a:r>
             <a:endParaRPr lang="ko-KR" altLang="en-US" sz="1100" b="1" dirty="0">
               <a:solidFill>
@@ -11226,10 +11265,10 @@
       </p:sp>
       <p:sp>
         <p:nvSpPr>
-          <p:cNvPr id="52" name="타원 51">
+          <p:cNvPr id="54" name="타원 53">
             <a:extLst>
               <a:ext uri="{FF2B5EF4-FFF2-40B4-BE49-F238E27FC236}">
-                <a16:creationId xmlns:a16="http://schemas.microsoft.com/office/drawing/2014/main" xmlns="" id="{214527EA-3F5E-4A77-AA8B-A562C5B0F6C2}"/>
+                <a16:creationId xmlns="" xmlns:a16="http://schemas.microsoft.com/office/drawing/2014/main" id="{AFCD2F96-5CAE-4D55-9CC1-0C2A73C51C9D}"/>
               </a:ext>
             </a:extLst>
           </p:cNvPr>
@@ -11238,7 +11277,7 @@
         </p:nvSpPr>
         <p:spPr>
           <a:xfrm>
-            <a:off x="3816380" y="2223459"/>
+            <a:off x="5424989" y="2241015"/>
             <a:ext cx="479394" cy="238036"/>
           </a:xfrm>
           <a:prstGeom prst="ellipse">
@@ -11282,7 +11321,7 @@
                   <a:srgbClr val="C00000"/>
                 </a:solidFill>
               </a:rPr>
-              <a:t>SD4</a:t>
+              <a:t>SD7</a:t>
             </a:r>
             <a:endParaRPr lang="ko-KR" altLang="en-US" sz="1100" b="1" dirty="0">
               <a:solidFill>
@@ -11294,10 +11333,10 @@
       </p:sp>
       <p:sp>
         <p:nvSpPr>
-          <p:cNvPr id="53" name="타원 52">
+          <p:cNvPr id="55" name="타원 54">
             <a:extLst>
               <a:ext uri="{FF2B5EF4-FFF2-40B4-BE49-F238E27FC236}">
-                <a16:creationId xmlns:a16="http://schemas.microsoft.com/office/drawing/2014/main" xmlns="" id="{BD37F2FA-E8CD-47F0-B041-42281CBBD1D5}"/>
+                <a16:creationId xmlns="" xmlns:a16="http://schemas.microsoft.com/office/drawing/2014/main" id="{7CE5C7E7-6196-4919-9E26-F786109572D0}"/>
               </a:ext>
             </a:extLst>
           </p:cNvPr>
@@ -11306,7 +11345,7 @@
         </p:nvSpPr>
         <p:spPr>
           <a:xfrm>
-            <a:off x="2637792" y="4142833"/>
+            <a:off x="5003100" y="3883271"/>
             <a:ext cx="479394" cy="238036"/>
           </a:xfrm>
           <a:prstGeom prst="ellipse">
@@ -11350,7 +11389,7 @@
                   <a:srgbClr val="C00000"/>
                 </a:solidFill>
               </a:rPr>
-              <a:t>SD6</a:t>
+              <a:t>SD3</a:t>
             </a:r>
             <a:endParaRPr lang="ko-KR" altLang="en-US" sz="1100" b="1" dirty="0">
               <a:solidFill>
@@ -11362,10 +11401,10 @@
       </p:sp>
       <p:sp>
         <p:nvSpPr>
-          <p:cNvPr id="54" name="타원 53">
+          <p:cNvPr id="56" name="타원 55">
             <a:extLst>
               <a:ext uri="{FF2B5EF4-FFF2-40B4-BE49-F238E27FC236}">
-                <a16:creationId xmlns:a16="http://schemas.microsoft.com/office/drawing/2014/main" xmlns="" id="{AFCD2F96-5CAE-4D55-9CC1-0C2A73C51C9D}"/>
+                <a16:creationId xmlns="" xmlns:a16="http://schemas.microsoft.com/office/drawing/2014/main" id="{1413D02F-4376-472C-B5B6-9D3FAE116D98}"/>
               </a:ext>
             </a:extLst>
           </p:cNvPr>
@@ -11374,7 +11413,7 @@
         </p:nvSpPr>
         <p:spPr>
           <a:xfrm>
-            <a:off x="5424989" y="2241015"/>
+            <a:off x="5489459" y="3883271"/>
             <a:ext cx="479394" cy="238036"/>
           </a:xfrm>
           <a:prstGeom prst="ellipse">
@@ -11418,7 +11457,7 @@
                   <a:srgbClr val="C00000"/>
                 </a:solidFill>
               </a:rPr>
-              <a:t>SD7</a:t>
+              <a:t>SD5</a:t>
             </a:r>
             <a:endParaRPr lang="ko-KR" altLang="en-US" sz="1100" b="1" dirty="0">
               <a:solidFill>
@@ -11430,10 +11469,10 @@
       </p:sp>
       <p:sp>
         <p:nvSpPr>
-          <p:cNvPr id="55" name="타원 54">
+          <p:cNvPr id="57" name="타원 56">
             <a:extLst>
               <a:ext uri="{FF2B5EF4-FFF2-40B4-BE49-F238E27FC236}">
-                <a16:creationId xmlns:a16="http://schemas.microsoft.com/office/drawing/2014/main" xmlns="" id="{7CE5C7E7-6196-4919-9E26-F786109572D0}"/>
+                <a16:creationId xmlns="" xmlns:a16="http://schemas.microsoft.com/office/drawing/2014/main" id="{79C1EAE1-FF6A-457D-B34B-58B6205BD145}"/>
               </a:ext>
             </a:extLst>
           </p:cNvPr>
@@ -11442,7 +11481,7 @@
         </p:nvSpPr>
         <p:spPr>
           <a:xfrm>
-            <a:off x="5003100" y="3883271"/>
+            <a:off x="6182837" y="3457883"/>
             <a:ext cx="479394" cy="238036"/>
           </a:xfrm>
           <a:prstGeom prst="ellipse">
@@ -11486,7 +11525,7 @@
                   <a:srgbClr val="C00000"/>
                 </a:solidFill>
               </a:rPr>
-              <a:t>SD3</a:t>
+              <a:t>SD8</a:t>
             </a:r>
             <a:endParaRPr lang="ko-KR" altLang="en-US" sz="1100" b="1" dirty="0">
               <a:solidFill>
@@ -11498,10 +11537,10 @@
       </p:sp>
       <p:sp>
         <p:nvSpPr>
-          <p:cNvPr id="56" name="타원 55">
+          <p:cNvPr id="58" name="타원 57">
             <a:extLst>
               <a:ext uri="{FF2B5EF4-FFF2-40B4-BE49-F238E27FC236}">
-                <a16:creationId xmlns:a16="http://schemas.microsoft.com/office/drawing/2014/main" xmlns="" id="{1413D02F-4376-472C-B5B6-9D3FAE116D98}"/>
+                <a16:creationId xmlns="" xmlns:a16="http://schemas.microsoft.com/office/drawing/2014/main" id="{D3BF1A94-9942-40EE-9FC7-1FC2D6573A24}"/>
               </a:ext>
             </a:extLst>
           </p:cNvPr>
@@ -11510,7 +11549,7 @@
         </p:nvSpPr>
         <p:spPr>
           <a:xfrm>
-            <a:off x="5489459" y="3883271"/>
+            <a:off x="6735553" y="2360033"/>
             <a:ext cx="479394" cy="238036"/>
           </a:xfrm>
           <a:prstGeom prst="ellipse">
@@ -11554,7 +11593,7 @@
                   <a:srgbClr val="C00000"/>
                 </a:solidFill>
               </a:rPr>
-              <a:t>SD5</a:t>
+              <a:t>SD1</a:t>
             </a:r>
             <a:endParaRPr lang="ko-KR" altLang="en-US" sz="1100" b="1" dirty="0">
               <a:solidFill>
@@ -11566,10 +11605,10 @@
       </p:sp>
       <p:sp>
         <p:nvSpPr>
-          <p:cNvPr id="57" name="타원 56">
+          <p:cNvPr id="59" name="타원 58">
             <a:extLst>
               <a:ext uri="{FF2B5EF4-FFF2-40B4-BE49-F238E27FC236}">
-                <a16:creationId xmlns:a16="http://schemas.microsoft.com/office/drawing/2014/main" xmlns="" id="{79C1EAE1-FF6A-457D-B34B-58B6205BD145}"/>
+                <a16:creationId xmlns="" xmlns:a16="http://schemas.microsoft.com/office/drawing/2014/main" id="{290C5C0B-6FF7-47DE-AA13-1D7BA72EEACD}"/>
               </a:ext>
             </a:extLst>
           </p:cNvPr>
@@ -11578,7 +11617,7 @@
         </p:nvSpPr>
         <p:spPr>
           <a:xfrm>
-            <a:off x="6182837" y="3457883"/>
+            <a:off x="7808324" y="1272352"/>
             <a:ext cx="479394" cy="238036"/>
           </a:xfrm>
           <a:prstGeom prst="ellipse">
@@ -11622,7 +11661,7 @@
                   <a:srgbClr val="C00000"/>
                 </a:solidFill>
               </a:rPr>
-              <a:t>SD8</a:t>
+              <a:t>SD2</a:t>
             </a:r>
             <a:endParaRPr lang="ko-KR" altLang="en-US" sz="1100" b="1" dirty="0">
               <a:solidFill>
@@ -11634,10 +11673,10 @@
       </p:sp>
       <p:sp>
         <p:nvSpPr>
-          <p:cNvPr id="58" name="타원 57">
+          <p:cNvPr id="60" name="타원 59">
             <a:extLst>
               <a:ext uri="{FF2B5EF4-FFF2-40B4-BE49-F238E27FC236}">
-                <a16:creationId xmlns:a16="http://schemas.microsoft.com/office/drawing/2014/main" xmlns="" id="{D3BF1A94-9942-40EE-9FC7-1FC2D6573A24}"/>
+                <a16:creationId xmlns="" xmlns:a16="http://schemas.microsoft.com/office/drawing/2014/main" id="{C88302A2-9351-4F02-B76E-00161A78BDBA}"/>
               </a:ext>
             </a:extLst>
           </p:cNvPr>
@@ -11646,7 +11685,7 @@
         </p:nvSpPr>
         <p:spPr>
           <a:xfrm>
-            <a:off x="6735553" y="2360033"/>
+            <a:off x="8178836" y="2244860"/>
             <a:ext cx="479394" cy="238036"/>
           </a:xfrm>
           <a:prstGeom prst="ellipse">
@@ -11690,7 +11729,7 @@
                   <a:srgbClr val="C00000"/>
                 </a:solidFill>
               </a:rPr>
-              <a:t>SD1</a:t>
+              <a:t>SD7</a:t>
             </a:r>
             <a:endParaRPr lang="ko-KR" altLang="en-US" sz="1100" b="1" dirty="0">
               <a:solidFill>
@@ -11702,10 +11741,10 @@
       </p:sp>
       <p:sp>
         <p:nvSpPr>
-          <p:cNvPr id="59" name="타원 58">
+          <p:cNvPr id="61" name="타원 60">
             <a:extLst>
               <a:ext uri="{FF2B5EF4-FFF2-40B4-BE49-F238E27FC236}">
-                <a16:creationId xmlns:a16="http://schemas.microsoft.com/office/drawing/2014/main" xmlns="" id="{290C5C0B-6FF7-47DE-AA13-1D7BA72EEACD}"/>
+                <a16:creationId xmlns="" xmlns:a16="http://schemas.microsoft.com/office/drawing/2014/main" id="{AF6CE26B-897D-48B0-B910-084056A7C677}"/>
               </a:ext>
             </a:extLst>
           </p:cNvPr>
@@ -11714,7 +11753,7 @@
         </p:nvSpPr>
         <p:spPr>
           <a:xfrm>
-            <a:off x="7808324" y="1272352"/>
+            <a:off x="8633511" y="1060579"/>
             <a:ext cx="479394" cy="238036"/>
           </a:xfrm>
           <a:prstGeom prst="ellipse">
@@ -11758,7 +11797,7 @@
                   <a:srgbClr val="C00000"/>
                 </a:solidFill>
               </a:rPr>
-              <a:t>SD2</a:t>
+              <a:t>SD9</a:t>
             </a:r>
             <a:endParaRPr lang="ko-KR" altLang="en-US" sz="1100" b="1" dirty="0">
               <a:solidFill>
@@ -11770,10 +11809,10 @@
       </p:sp>
       <p:sp>
         <p:nvSpPr>
-          <p:cNvPr id="60" name="타원 59">
+          <p:cNvPr id="62" name="타원 61">
             <a:extLst>
               <a:ext uri="{FF2B5EF4-FFF2-40B4-BE49-F238E27FC236}">
-                <a16:creationId xmlns:a16="http://schemas.microsoft.com/office/drawing/2014/main" xmlns="" id="{C88302A2-9351-4F02-B76E-00161A78BDBA}"/>
+                <a16:creationId xmlns="" xmlns:a16="http://schemas.microsoft.com/office/drawing/2014/main" id="{2176C940-B3F5-4781-A426-FE55D18A29BD}"/>
               </a:ext>
             </a:extLst>
           </p:cNvPr>
@@ -11782,8 +11821,8 @@
         </p:nvSpPr>
         <p:spPr>
           <a:xfrm>
-            <a:off x="8178836" y="2244860"/>
-            <a:ext cx="479394" cy="238036"/>
+            <a:off x="6341531" y="5629964"/>
+            <a:ext cx="1020234" cy="476071"/>
           </a:xfrm>
           <a:prstGeom prst="ellipse">
             <a:avLst/>
@@ -11814,7 +11853,7 @@
           </a:fontRef>
         </p:style>
         <p:txBody>
-          <a:bodyPr lIns="0" tIns="0" rIns="0" bIns="0" rtlCol="0" anchor="ctr" anchorCtr="1">
+          <a:bodyPr wrap="square" lIns="0" tIns="0" rIns="0" bIns="0" rtlCol="0" anchor="ctr" anchorCtr="1">
             <a:spAutoFit/>
           </a:bodyPr>
           <a:lstStyle/>
@@ -11826,7 +11865,7 @@
                   <a:srgbClr val="C00000"/>
                 </a:solidFill>
               </a:rPr>
-              <a:t>SD7</a:t>
+              <a:t>Security Design ID</a:t>
             </a:r>
             <a:endParaRPr lang="ko-KR" altLang="en-US" sz="1100" b="1" dirty="0">
               <a:solidFill>
@@ -11838,32 +11877,232 @@
       </p:sp>
       <p:sp>
         <p:nvSpPr>
-          <p:cNvPr id="61" name="타원 60">
-            <a:extLst>
-              <a:ext uri="{FF2B5EF4-FFF2-40B4-BE49-F238E27FC236}">
-                <a16:creationId xmlns:a16="http://schemas.microsoft.com/office/drawing/2014/main" xmlns="" id="{AF6CE26B-897D-48B0-B910-084056A7C677}"/>
-              </a:ext>
-            </a:extLst>
-          </p:cNvPr>
+          <p:cNvPr id="65" name="Google Shape;218;p55"/>
           <p:cNvSpPr/>
           <p:nvPr/>
         </p:nvSpPr>
         <p:spPr>
           <a:xfrm>
-            <a:off x="8633511" y="1060579"/>
-            <a:ext cx="479394" cy="238036"/>
-          </a:xfrm>
-          <a:prstGeom prst="ellipse">
+            <a:off x="4708853" y="4206594"/>
+            <a:ext cx="1260000" cy="432000"/>
+          </a:xfrm>
+          <a:prstGeom prst="rect">
             <a:avLst/>
           </a:prstGeom>
           <a:solidFill>
-            <a:srgbClr val="FFFF00"/>
+            <a:srgbClr val="FFC000">
+              <a:alpha val="49411"/>
+            </a:srgbClr>
           </a:solidFill>
-          <a:ln w="28575">
-            <a:solidFill>
-              <a:schemeClr val="tx1"/>
-            </a:solidFill>
-          </a:ln>
+          <a:ln w="28575" cap="flat" cmpd="sng">
+            <a:solidFill>
+              <a:srgbClr val="7F7F7F"/>
+            </a:solidFill>
+            <a:prstDash val="sysDash"/>
+            <a:round/>
+            <a:headEnd type="none" w="sm" len="sm"/>
+            <a:tailEnd type="none" w="sm" len="sm"/>
+          </a:ln>
+        </p:spPr>
+        <p:txBody>
+          <a:bodyPr spcFirstLastPara="1" wrap="square" lIns="91425" tIns="45700" rIns="91425" bIns="45700" anchor="ctr" anchorCtr="0">
+            <a:noAutofit/>
+          </a:bodyPr>
+          <a:lstStyle/>
+          <a:p>
+            <a:pPr marL="0" marR="0" lvl="0" indent="0" algn="ctr" rtl="0">
+              <a:lnSpc>
+                <a:spcPct val="100000"/>
+              </a:lnSpc>
+              <a:spcBef>
+                <a:spcPts val="0"/>
+              </a:spcBef>
+              <a:spcAft>
+                <a:spcPts val="0"/>
+              </a:spcAft>
+              <a:buClr>
+                <a:srgbClr val="000000"/>
+              </a:buClr>
+              <a:buSzPts val="1200"/>
+              <a:buFont typeface="Arial"/>
+              <a:buNone/>
+            </a:pPr>
+            <a:r>
+              <a:rPr lang="en-US" sz="1200" b="0" i="0" u="none" strike="noStrike" cap="none" dirty="0" smtClean="0">
+                <a:solidFill>
+                  <a:schemeClr val="dk1"/>
+                </a:solidFill>
+                <a:latin typeface="Arial" panose="020B0604020202020204" pitchFamily="34" charset="0"/>
+                <a:cs typeface="Arial" panose="020B0604020202020204" pitchFamily="34" charset="0"/>
+                <a:sym typeface="Arial"/>
+              </a:rPr>
+              <a:t>Log</a:t>
+            </a:r>
+            <a:endParaRPr sz="1200" b="0" i="0" u="none" strike="noStrike" cap="none" dirty="0">
+              <a:solidFill>
+                <a:schemeClr val="dk1"/>
+              </a:solidFill>
+              <a:latin typeface="Arial" panose="020B0604020202020204" pitchFamily="34" charset="0"/>
+              <a:cs typeface="Arial" panose="020B0604020202020204" pitchFamily="34" charset="0"/>
+              <a:sym typeface="Arial"/>
+            </a:endParaRPr>
+          </a:p>
+        </p:txBody>
+      </p:sp>
+      <p:sp>
+        <p:nvSpPr>
+          <p:cNvPr id="67" name="Google Shape;194;p55"/>
+          <p:cNvSpPr/>
+          <p:nvPr/>
+        </p:nvSpPr>
+        <p:spPr>
+          <a:xfrm>
+            <a:off x="7897733" y="6168499"/>
+            <a:ext cx="684076" cy="288032"/>
+          </a:xfrm>
+          <a:prstGeom prst="rect">
+            <a:avLst/>
+          </a:prstGeom>
+          <a:solidFill>
+            <a:srgbClr val="FFC000">
+              <a:alpha val="49019"/>
+            </a:srgbClr>
+          </a:solidFill>
+          <a:ln w="28575" cap="flat" cmpd="sng">
+            <a:solidFill>
+              <a:srgbClr val="7F7F7F"/>
+            </a:solidFill>
+            <a:prstDash val="sysDash"/>
+            <a:round/>
+            <a:headEnd type="none" w="sm" len="sm"/>
+            <a:tailEnd type="none" w="sm" len="sm"/>
+          </a:ln>
+        </p:spPr>
+        <p:txBody>
+          <a:bodyPr spcFirstLastPara="1" wrap="square" lIns="91425" tIns="45700" rIns="91425" bIns="45700" anchor="ctr" anchorCtr="0">
+            <a:noAutofit/>
+          </a:bodyPr>
+          <a:lstStyle/>
+          <a:p>
+            <a:pPr marL="0" marR="0" lvl="0" indent="0" algn="ctr" rtl="0">
+              <a:lnSpc>
+                <a:spcPct val="100000"/>
+              </a:lnSpc>
+              <a:spcBef>
+                <a:spcPts val="0"/>
+              </a:spcBef>
+              <a:spcAft>
+                <a:spcPts val="0"/>
+              </a:spcAft>
+              <a:buClr>
+                <a:srgbClr val="000000"/>
+              </a:buClr>
+              <a:buSzPts val="1200"/>
+              <a:buFont typeface="Arial"/>
+              <a:buNone/>
+            </a:pPr>
+            <a:endParaRPr sz="1200" b="0" i="0" u="none" strike="noStrike" cap="none">
+              <a:solidFill>
+                <a:schemeClr val="dk1"/>
+              </a:solidFill>
+              <a:latin typeface="Arial" panose="020B0604020202020204" pitchFamily="34" charset="0"/>
+              <a:cs typeface="Arial" panose="020B0604020202020204" pitchFamily="34" charset="0"/>
+              <a:sym typeface="Arial"/>
+            </a:endParaRPr>
+          </a:p>
+        </p:txBody>
+      </p:sp>
+      <p:sp>
+        <p:nvSpPr>
+          <p:cNvPr id="68" name="Google Shape;193;p55"/>
+          <p:cNvSpPr txBox="1"/>
+          <p:nvPr/>
+        </p:nvSpPr>
+        <p:spPr>
+          <a:xfrm>
+            <a:off x="8633510" y="6174035"/>
+            <a:ext cx="2217991" cy="276959"/>
+          </a:xfrm>
+          <a:prstGeom prst="rect">
+            <a:avLst/>
+          </a:prstGeom>
+          <a:noFill/>
+          <a:ln>
+            <a:noFill/>
+          </a:ln>
+        </p:spPr>
+        <p:txBody>
+          <a:bodyPr spcFirstLastPara="1" wrap="square" lIns="91425" tIns="45700" rIns="91425" bIns="45700" anchor="t" anchorCtr="0">
+            <a:spAutoFit/>
+          </a:bodyPr>
+          <a:lstStyle/>
+          <a:p>
+            <a:pPr marL="0" marR="0" lvl="0" indent="0" algn="l" rtl="0">
+              <a:lnSpc>
+                <a:spcPct val="100000"/>
+              </a:lnSpc>
+              <a:spcBef>
+                <a:spcPts val="0"/>
+              </a:spcBef>
+              <a:spcAft>
+                <a:spcPts val="0"/>
+              </a:spcAft>
+              <a:buClr>
+                <a:srgbClr val="000000"/>
+              </a:buClr>
+              <a:buSzPts val="1200"/>
+              <a:buFont typeface="Arial"/>
+              <a:buNone/>
+            </a:pPr>
+            <a:r>
+              <a:rPr lang="en-US" sz="1200" dirty="0" smtClean="0">
+                <a:solidFill>
+                  <a:schemeClr val="dk1"/>
+                </a:solidFill>
+                <a:latin typeface="Arial" panose="020B0604020202020204" pitchFamily="34" charset="0"/>
+                <a:cs typeface="Arial" panose="020B0604020202020204" pitchFamily="34" charset="0"/>
+              </a:rPr>
+              <a:t>Unspecified </a:t>
+            </a:r>
+            <a:r>
+              <a:rPr lang="en-US" sz="1200" b="0" i="0" u="none" strike="noStrike" cap="none" dirty="0" smtClean="0">
+                <a:solidFill>
+                  <a:schemeClr val="dk1"/>
+                </a:solidFill>
+                <a:latin typeface="Arial" panose="020B0604020202020204" pitchFamily="34" charset="0"/>
+                <a:cs typeface="Arial" panose="020B0604020202020204" pitchFamily="34" charset="0"/>
+                <a:sym typeface="Arial"/>
+              </a:rPr>
+              <a:t>Component</a:t>
+            </a:r>
+            <a:endParaRPr sz="1400" b="0" i="0" u="none" strike="noStrike" cap="none" dirty="0">
+              <a:solidFill>
+                <a:srgbClr val="000000"/>
+              </a:solidFill>
+              <a:latin typeface="Arial" panose="020B0604020202020204" pitchFamily="34" charset="0"/>
+              <a:cs typeface="Arial" panose="020B0604020202020204" pitchFamily="34" charset="0"/>
+              <a:sym typeface="Arial"/>
+            </a:endParaRPr>
+          </a:p>
+        </p:txBody>
+      </p:sp>
+      <p:sp>
+        <p:nvSpPr>
+          <p:cNvPr id="2" name="폭발 1 1"/>
+          <p:cNvSpPr/>
+          <p:nvPr/>
+        </p:nvSpPr>
+        <p:spPr>
+          <a:xfrm>
+            <a:off x="1694576" y="4428778"/>
+            <a:ext cx="766103" cy="811188"/>
+          </a:xfrm>
+          <a:prstGeom prst="irregularSeal1">
+            <a:avLst/>
+          </a:prstGeom>
+          <a:solidFill>
+            <a:srgbClr val="FF0000"/>
+          </a:solidFill>
         </p:spPr>
         <p:style>
           <a:lnRef idx="2">
@@ -11882,56 +12121,35 @@
           </a:fontRef>
         </p:style>
         <p:txBody>
-          <a:bodyPr lIns="0" tIns="0" rIns="0" bIns="0" rtlCol="0" anchor="ctr" anchorCtr="1">
-            <a:spAutoFit/>
-          </a:bodyPr>
+          <a:bodyPr rtlCol="0" anchor="ctr"/>
           <a:lstStyle/>
           <a:p>
             <a:pPr algn="ctr"/>
             <a:r>
-              <a:rPr lang="en-US" altLang="ko-KR" sz="1100" b="1" dirty="0">
-                <a:solidFill>
-                  <a:srgbClr val="C00000"/>
-                </a:solidFill>
-              </a:rPr>
-              <a:t>SD9</a:t>
-            </a:r>
-            <a:endParaRPr lang="ko-KR" altLang="en-US" sz="1100" b="1" dirty="0">
-              <a:solidFill>
-                <a:srgbClr val="C00000"/>
-              </a:solidFill>
-            </a:endParaRPr>
-          </a:p>
-        </p:txBody>
-      </p:sp>
-      <p:sp>
-        <p:nvSpPr>
-          <p:cNvPr id="62" name="타원 61">
-            <a:extLst>
-              <a:ext uri="{FF2B5EF4-FFF2-40B4-BE49-F238E27FC236}">
-                <a16:creationId xmlns:a16="http://schemas.microsoft.com/office/drawing/2014/main" xmlns="" id="{2176C940-B3F5-4781-A426-FE55D18A29BD}"/>
-              </a:ext>
-            </a:extLst>
-          </p:cNvPr>
+              <a:rPr lang="en-US" altLang="ko-KR" sz="1000" b="1" dirty="0" smtClean="0"/>
+              <a:t>V01V09</a:t>
+            </a:r>
+            <a:endParaRPr lang="ko-KR" altLang="en-US" sz="1000" b="1" dirty="0"/>
+          </a:p>
+        </p:txBody>
+      </p:sp>
+      <p:sp>
+        <p:nvSpPr>
+          <p:cNvPr id="72" name="폭발 1 71"/>
           <p:cNvSpPr/>
           <p:nvPr/>
         </p:nvSpPr>
         <p:spPr>
           <a:xfrm>
-            <a:off x="6341531" y="5669337"/>
-            <a:ext cx="1020234" cy="476071"/>
-          </a:xfrm>
-          <a:prstGeom prst="ellipse">
+            <a:off x="4527509" y="4364347"/>
+            <a:ext cx="788568" cy="811188"/>
+          </a:xfrm>
+          <a:prstGeom prst="irregularSeal1">
             <a:avLst/>
           </a:prstGeom>
           <a:solidFill>
-            <a:srgbClr val="FFFF00"/>
+            <a:srgbClr val="FF0000"/>
           </a:solidFill>
-          <a:ln w="28575">
-            <a:solidFill>
-              <a:schemeClr val="tx1"/>
-            </a:solidFill>
-          </a:ln>
         </p:spPr>
         <p:style>
           <a:lnRef idx="2">
@@ -11950,256 +12168,31 @@
           </a:fontRef>
         </p:style>
         <p:txBody>
-          <a:bodyPr wrap="square" lIns="0" tIns="0" rIns="0" bIns="0" rtlCol="0" anchor="ctr" anchorCtr="1">
-            <a:spAutoFit/>
-          </a:bodyPr>
+          <a:bodyPr rtlCol="0" anchor="ctr"/>
           <a:lstStyle/>
           <a:p>
             <a:pPr algn="ctr"/>
             <a:r>
-              <a:rPr lang="en-US" altLang="ko-KR" sz="1100" b="1" dirty="0">
-                <a:solidFill>
-                  <a:srgbClr val="C00000"/>
-                </a:solidFill>
-              </a:rPr>
-              <a:t>Security Design ID</a:t>
-            </a:r>
-            <a:endParaRPr lang="ko-KR" altLang="en-US" sz="1100" b="1" dirty="0">
-              <a:solidFill>
-                <a:srgbClr val="C00000"/>
-              </a:solidFill>
-            </a:endParaRPr>
-          </a:p>
-        </p:txBody>
-      </p:sp>
-      <p:sp>
-        <p:nvSpPr>
-          <p:cNvPr id="65" name="Google Shape;218;p55"/>
+              <a:rPr lang="en-US" altLang="ko-KR" sz="1000" b="1" dirty="0" smtClean="0"/>
+              <a:t>V03</a:t>
+            </a:r>
+            <a:endParaRPr lang="ko-KR" altLang="en-US" sz="1000" b="1" dirty="0"/>
+          </a:p>
+        </p:txBody>
+      </p:sp>
+      <p:sp>
+        <p:nvSpPr>
+          <p:cNvPr id="73" name="폭발 1 72"/>
           <p:cNvSpPr/>
           <p:nvPr/>
         </p:nvSpPr>
         <p:spPr>
           <a:xfrm>
-            <a:off x="4708853" y="4206594"/>
-            <a:ext cx="1260000" cy="432000"/>
-          </a:xfrm>
-          <a:prstGeom prst="rect">
-            <a:avLst/>
-          </a:prstGeom>
-          <a:solidFill>
-            <a:srgbClr val="FFC000">
-              <a:alpha val="49411"/>
-            </a:srgbClr>
-          </a:solidFill>
-          <a:ln w="28575" cap="flat" cmpd="sng">
-            <a:solidFill>
-              <a:srgbClr val="7F7F7F"/>
-            </a:solidFill>
-            <a:prstDash val="sysDash"/>
-            <a:round/>
-            <a:headEnd type="none" w="sm" len="sm"/>
-            <a:tailEnd type="none" w="sm" len="sm"/>
-          </a:ln>
-        </p:spPr>
-        <p:txBody>
-          <a:bodyPr spcFirstLastPara="1" wrap="square" lIns="91425" tIns="45700" rIns="91425" bIns="45700" anchor="ctr" anchorCtr="0">
-            <a:noAutofit/>
-          </a:bodyPr>
-          <a:lstStyle/>
-          <a:p>
-            <a:pPr marL="0" marR="0" lvl="0" indent="0" algn="ctr" rtl="0">
-              <a:lnSpc>
-                <a:spcPct val="100000"/>
-              </a:lnSpc>
-              <a:spcBef>
-                <a:spcPts val="0"/>
-              </a:spcBef>
-              <a:spcAft>
-                <a:spcPts val="0"/>
-              </a:spcAft>
-              <a:buClr>
-                <a:srgbClr val="000000"/>
-              </a:buClr>
-              <a:buSzPts val="1200"/>
-              <a:buFont typeface="Arial"/>
-              <a:buNone/>
-            </a:pPr>
-            <a:r>
-              <a:rPr lang="en-US" sz="1200" b="0" i="0" u="none" strike="noStrike" cap="none" dirty="0" smtClean="0">
-                <a:solidFill>
-                  <a:schemeClr val="dk1"/>
-                </a:solidFill>
-                <a:latin typeface="Arial" panose="020B0604020202020204" pitchFamily="34" charset="0"/>
-                <a:cs typeface="Arial" panose="020B0604020202020204" pitchFamily="34" charset="0"/>
-                <a:sym typeface="Arial"/>
-              </a:rPr>
-              <a:t>Log</a:t>
-            </a:r>
-            <a:endParaRPr sz="1200" b="0" i="0" u="none" strike="noStrike" cap="none" dirty="0">
-              <a:solidFill>
-                <a:schemeClr val="dk1"/>
-              </a:solidFill>
-              <a:latin typeface="Arial" panose="020B0604020202020204" pitchFamily="34" charset="0"/>
-              <a:cs typeface="Arial" panose="020B0604020202020204" pitchFamily="34" charset="0"/>
-              <a:sym typeface="Arial"/>
-            </a:endParaRPr>
-          </a:p>
-        </p:txBody>
-      </p:sp>
-      <p:sp>
-        <p:nvSpPr>
-          <p:cNvPr id="67" name="Google Shape;194;p55"/>
-          <p:cNvSpPr/>
-          <p:nvPr/>
-        </p:nvSpPr>
-        <p:spPr>
-          <a:xfrm>
-            <a:off x="7897733" y="6168499"/>
-            <a:ext cx="684076" cy="288032"/>
-          </a:xfrm>
-          <a:prstGeom prst="rect">
-            <a:avLst/>
-          </a:prstGeom>
-          <a:solidFill>
-            <a:srgbClr val="FFC000">
-              <a:alpha val="49019"/>
-            </a:srgbClr>
-          </a:solidFill>
-          <a:ln w="28575" cap="flat" cmpd="sng">
-            <a:solidFill>
-              <a:srgbClr val="7F7F7F"/>
-            </a:solidFill>
-            <a:prstDash val="sysDash"/>
-            <a:round/>
-            <a:headEnd type="none" w="sm" len="sm"/>
-            <a:tailEnd type="none" w="sm" len="sm"/>
-          </a:ln>
-        </p:spPr>
-        <p:txBody>
-          <a:bodyPr spcFirstLastPara="1" wrap="square" lIns="91425" tIns="45700" rIns="91425" bIns="45700" anchor="ctr" anchorCtr="0">
-            <a:noAutofit/>
-          </a:bodyPr>
-          <a:lstStyle/>
-          <a:p>
-            <a:pPr marL="0" marR="0" lvl="0" indent="0" algn="ctr" rtl="0">
-              <a:lnSpc>
-                <a:spcPct val="100000"/>
-              </a:lnSpc>
-              <a:spcBef>
-                <a:spcPts val="0"/>
-              </a:spcBef>
-              <a:spcAft>
-                <a:spcPts val="0"/>
-              </a:spcAft>
-              <a:buClr>
-                <a:srgbClr val="000000"/>
-              </a:buClr>
-              <a:buSzPts val="1200"/>
-              <a:buFont typeface="Arial"/>
-              <a:buNone/>
-            </a:pPr>
-            <a:endParaRPr sz="1200" b="0" i="0" u="none" strike="noStrike" cap="none">
-              <a:solidFill>
-                <a:schemeClr val="dk1"/>
-              </a:solidFill>
-              <a:latin typeface="Arial" panose="020B0604020202020204" pitchFamily="34" charset="0"/>
-              <a:cs typeface="Arial" panose="020B0604020202020204" pitchFamily="34" charset="0"/>
-              <a:sym typeface="Arial"/>
-            </a:endParaRPr>
-          </a:p>
-        </p:txBody>
-      </p:sp>
-      <p:sp>
-        <p:nvSpPr>
-          <p:cNvPr id="68" name="Google Shape;193;p55"/>
-          <p:cNvSpPr txBox="1"/>
-          <p:nvPr/>
-        </p:nvSpPr>
-        <p:spPr>
-          <a:xfrm>
-            <a:off x="8633510" y="6174035"/>
-            <a:ext cx="2217991" cy="276959"/>
-          </a:xfrm>
-          <a:prstGeom prst="rect">
-            <a:avLst/>
-          </a:prstGeom>
-          <a:noFill/>
-          <a:ln>
-            <a:noFill/>
-          </a:ln>
-        </p:spPr>
-        <p:txBody>
-          <a:bodyPr spcFirstLastPara="1" wrap="square" lIns="91425" tIns="45700" rIns="91425" bIns="45700" anchor="t" anchorCtr="0">
-            <a:spAutoFit/>
-          </a:bodyPr>
-          <a:lstStyle/>
-          <a:p>
-            <a:pPr marL="0" marR="0" lvl="0" indent="0" algn="l" rtl="0">
-              <a:lnSpc>
-                <a:spcPct val="100000"/>
-              </a:lnSpc>
-              <a:spcBef>
-                <a:spcPts val="0"/>
-              </a:spcBef>
-              <a:spcAft>
-                <a:spcPts val="0"/>
-              </a:spcAft>
-              <a:buClr>
-                <a:srgbClr val="000000"/>
-              </a:buClr>
-              <a:buSzPts val="1200"/>
-              <a:buFont typeface="Arial"/>
-              <a:buNone/>
-            </a:pPr>
-            <a:r>
-              <a:rPr lang="en-US" sz="1200" dirty="0" smtClean="0">
-                <a:solidFill>
-                  <a:schemeClr val="dk1"/>
-                </a:solidFill>
-                <a:latin typeface="Arial" panose="020B0604020202020204" pitchFamily="34" charset="0"/>
-                <a:cs typeface="Arial" panose="020B0604020202020204" pitchFamily="34" charset="0"/>
-              </a:rPr>
-              <a:t>Unspecified </a:t>
-            </a:r>
-            <a:r>
-              <a:rPr lang="en-US" sz="1200" b="0" i="0" u="none" strike="noStrike" cap="none" dirty="0" smtClean="0">
-                <a:solidFill>
-                  <a:schemeClr val="dk1"/>
-                </a:solidFill>
-                <a:latin typeface="Arial" panose="020B0604020202020204" pitchFamily="34" charset="0"/>
-                <a:cs typeface="Arial" panose="020B0604020202020204" pitchFamily="34" charset="0"/>
-                <a:sym typeface="Arial"/>
-              </a:rPr>
-              <a:t>Component</a:t>
-            </a:r>
-            <a:endParaRPr sz="1400" b="0" i="0" u="none" strike="noStrike" cap="none" dirty="0">
-              <a:solidFill>
-                <a:srgbClr val="000000"/>
-              </a:solidFill>
-              <a:latin typeface="Arial" panose="020B0604020202020204" pitchFamily="34" charset="0"/>
-              <a:cs typeface="Arial" panose="020B0604020202020204" pitchFamily="34" charset="0"/>
-              <a:sym typeface="Arial"/>
-            </a:endParaRPr>
-          </a:p>
-        </p:txBody>
-      </p:sp>
-      <p:sp>
-        <p:nvSpPr>
-          <p:cNvPr id="69" name="모서리가 둥근 사각형 설명선 68"/>
-          <p:cNvSpPr/>
-          <p:nvPr/>
-        </p:nvSpPr>
-        <p:spPr>
-          <a:xfrm>
-            <a:off x="4441103" y="2988732"/>
-            <a:ext cx="801694" cy="332235"/>
-          </a:xfrm>
-          <a:prstGeom prst="wedgeRoundRectCallout">
-            <a:avLst>
-              <a:gd name="adj1" fmla="val -4759"/>
-              <a:gd name="adj2" fmla="val -107359"/>
-              <a:gd name="adj3" fmla="val 16667"/>
-            </a:avLst>
+            <a:off x="2846626" y="2967398"/>
+            <a:ext cx="780110" cy="813018"/>
+          </a:xfrm>
+          <a:prstGeom prst="irregularSeal1">
+            <a:avLst/>
           </a:prstGeom>
           <a:solidFill>
             <a:srgbClr val="FF0000"/>
@@ -12228,29 +12221,25 @@
             <a:pPr algn="ctr"/>
             <a:r>
               <a:rPr lang="en-US" altLang="ko-KR" sz="1000" b="1" dirty="0" smtClean="0"/>
-              <a:t>V04,V05,V08</a:t>
-            </a:r>
-            <a:endParaRPr lang="ko-KR" altLang="en-US" sz="1000" b="1"/>
-          </a:p>
-        </p:txBody>
-      </p:sp>
-      <p:sp>
-        <p:nvSpPr>
-          <p:cNvPr id="70" name="모서리가 둥근 사각형 설명선 69"/>
+              <a:t>V07</a:t>
+            </a:r>
+            <a:endParaRPr lang="ko-KR" altLang="en-US" sz="1000" b="1" dirty="0"/>
+          </a:p>
+        </p:txBody>
+      </p:sp>
+      <p:sp>
+        <p:nvSpPr>
+          <p:cNvPr id="74" name="폭발 1 73"/>
           <p:cNvSpPr/>
           <p:nvPr/>
         </p:nvSpPr>
         <p:spPr>
           <a:xfrm>
-            <a:off x="8077789" y="3938045"/>
-            <a:ext cx="681488" cy="332235"/>
-          </a:xfrm>
-          <a:prstGeom prst="wedgeRoundRectCallout">
-            <a:avLst>
-              <a:gd name="adj1" fmla="val 4825"/>
-              <a:gd name="adj2" fmla="val -112977"/>
-              <a:gd name="adj3" fmla="val 16667"/>
-            </a:avLst>
+            <a:off x="4418199" y="2640816"/>
+            <a:ext cx="817147" cy="835885"/>
+          </a:xfrm>
+          <a:prstGeom prst="irregularSeal1">
+            <a:avLst/>
           </a:prstGeom>
           <a:solidFill>
             <a:srgbClr val="FF0000"/>
@@ -12279,29 +12268,39 @@
             <a:pPr algn="ctr"/>
             <a:r>
               <a:rPr lang="en-US" altLang="ko-KR" sz="1000" b="1" dirty="0" smtClean="0"/>
-              <a:t>V06</a:t>
-            </a:r>
-            <a:endParaRPr lang="ko-KR" altLang="en-US" sz="1000" b="1"/>
-          </a:p>
-        </p:txBody>
-      </p:sp>
-      <p:sp>
-        <p:nvSpPr>
-          <p:cNvPr id="71" name="모서리가 둥근 사각형 설명선 70"/>
+              <a:t>V04</a:t>
+            </a:r>
+          </a:p>
+          <a:p>
+            <a:pPr algn="ctr"/>
+            <a:r>
+              <a:rPr lang="en-US" altLang="ko-KR" sz="1000" b="1" dirty="0" smtClean="0"/>
+              <a:t>V05</a:t>
+            </a:r>
+          </a:p>
+          <a:p>
+            <a:pPr algn="ctr"/>
+            <a:r>
+              <a:rPr lang="en-US" altLang="ko-KR" sz="1000" b="1" dirty="0" smtClean="0"/>
+              <a:t>V08</a:t>
+            </a:r>
+            <a:endParaRPr lang="ko-KR" altLang="en-US" sz="1000" b="1" dirty="0"/>
+          </a:p>
+        </p:txBody>
+      </p:sp>
+      <p:sp>
+        <p:nvSpPr>
+          <p:cNvPr id="75" name="폭발 1 74"/>
           <p:cNvSpPr/>
           <p:nvPr/>
         </p:nvSpPr>
         <p:spPr>
           <a:xfrm>
-            <a:off x="2674960" y="3228241"/>
-            <a:ext cx="681488" cy="332235"/>
-          </a:xfrm>
-          <a:prstGeom prst="wedgeRoundRectCallout">
-            <a:avLst>
-              <a:gd name="adj1" fmla="val 33577"/>
-              <a:gd name="adj2" fmla="val 86422"/>
-              <a:gd name="adj3" fmla="val 16667"/>
-            </a:avLst>
+            <a:off x="6634185" y="2689872"/>
+            <a:ext cx="763552" cy="811188"/>
+          </a:xfrm>
+          <a:prstGeom prst="irregularSeal1">
+            <a:avLst/>
           </a:prstGeom>
           <a:solidFill>
             <a:srgbClr val="FF0000"/>
@@ -12330,29 +12329,25 @@
             <a:pPr algn="ctr"/>
             <a:r>
               <a:rPr lang="en-US" altLang="ko-KR" sz="1000" b="1" dirty="0" smtClean="0"/>
-              <a:t>V07</a:t>
-            </a:r>
-            <a:endParaRPr lang="ko-KR" altLang="en-US" sz="1000" b="1"/>
-          </a:p>
-        </p:txBody>
-      </p:sp>
-      <p:sp>
-        <p:nvSpPr>
-          <p:cNvPr id="63" name="모서리가 둥근 사각형 설명선 62"/>
+              <a:t>V02</a:t>
+            </a:r>
+            <a:endParaRPr lang="ko-KR" altLang="en-US" sz="1000" b="1" dirty="0"/>
+          </a:p>
+        </p:txBody>
+      </p:sp>
+      <p:sp>
+        <p:nvSpPr>
+          <p:cNvPr id="76" name="폭발 1 75"/>
           <p:cNvSpPr/>
           <p:nvPr/>
         </p:nvSpPr>
         <p:spPr>
           <a:xfrm>
-            <a:off x="4735636" y="4825112"/>
-            <a:ext cx="681488" cy="332235"/>
-          </a:xfrm>
-          <a:prstGeom prst="wedgeRoundRectCallout">
-            <a:avLst>
-              <a:gd name="adj1" fmla="val -8866"/>
-              <a:gd name="adj2" fmla="val -132636"/>
-              <a:gd name="adj3" fmla="val 16667"/>
-            </a:avLst>
+            <a:off x="8035124" y="3702495"/>
+            <a:ext cx="817455" cy="811188"/>
+          </a:xfrm>
+          <a:prstGeom prst="irregularSeal1">
+            <a:avLst/>
           </a:prstGeom>
           <a:solidFill>
             <a:srgbClr val="FF0000"/>
@@ -12381,9 +12376,116 @@
             <a:pPr algn="ctr"/>
             <a:r>
               <a:rPr lang="en-US" altLang="ko-KR" sz="1000" b="1" dirty="0" smtClean="0"/>
-              <a:t>V03</a:t>
-            </a:r>
-            <a:endParaRPr lang="ko-KR" altLang="en-US" sz="1000" b="1"/>
+              <a:t>V06</a:t>
+            </a:r>
+            <a:endParaRPr lang="ko-KR" altLang="en-US" sz="1000" b="1" dirty="0"/>
+          </a:p>
+        </p:txBody>
+      </p:sp>
+      <p:sp>
+        <p:nvSpPr>
+          <p:cNvPr id="77" name="폭발 1 76"/>
+          <p:cNvSpPr/>
+          <p:nvPr/>
+        </p:nvSpPr>
+        <p:spPr>
+          <a:xfrm>
+            <a:off x="5787490" y="6070819"/>
+            <a:ext cx="460785" cy="474863"/>
+          </a:xfrm>
+          <a:prstGeom prst="irregularSeal1">
+            <a:avLst/>
+          </a:prstGeom>
+          <a:solidFill>
+            <a:srgbClr val="FF0000"/>
+          </a:solidFill>
+        </p:spPr>
+        <p:style>
+          <a:lnRef idx="2">
+            <a:schemeClr val="accent1">
+              <a:shade val="50000"/>
+            </a:schemeClr>
+          </a:lnRef>
+          <a:fillRef idx="1">
+            <a:schemeClr val="accent1"/>
+          </a:fillRef>
+          <a:effectRef idx="0">
+            <a:schemeClr val="accent1"/>
+          </a:effectRef>
+          <a:fontRef idx="minor">
+            <a:schemeClr val="lt1"/>
+          </a:fontRef>
+        </p:style>
+        <p:txBody>
+          <a:bodyPr rtlCol="0" anchor="ctr"/>
+          <a:lstStyle/>
+          <a:p>
+            <a:pPr algn="ctr"/>
+            <a:endParaRPr lang="ko-KR" altLang="en-US" sz="1000" b="1" dirty="0"/>
+          </a:p>
+        </p:txBody>
+      </p:sp>
+      <p:sp>
+        <p:nvSpPr>
+          <p:cNvPr id="78" name="Google Shape;197;p55"/>
+          <p:cNvSpPr txBox="1"/>
+          <p:nvPr/>
+        </p:nvSpPr>
+        <p:spPr>
+          <a:xfrm>
+            <a:off x="6274126" y="6174035"/>
+            <a:ext cx="1675888" cy="276959"/>
+          </a:xfrm>
+          <a:prstGeom prst="rect">
+            <a:avLst/>
+          </a:prstGeom>
+          <a:noFill/>
+          <a:ln>
+            <a:noFill/>
+          </a:ln>
+        </p:spPr>
+        <p:txBody>
+          <a:bodyPr spcFirstLastPara="1" wrap="square" lIns="91425" tIns="45700" rIns="91425" bIns="45700" anchor="t" anchorCtr="0">
+            <a:spAutoFit/>
+          </a:bodyPr>
+          <a:lstStyle/>
+          <a:p>
+            <a:pPr marL="0" marR="0" lvl="0" indent="0" algn="l" rtl="0">
+              <a:lnSpc>
+                <a:spcPct val="100000"/>
+              </a:lnSpc>
+              <a:spcBef>
+                <a:spcPts val="0"/>
+              </a:spcBef>
+              <a:spcAft>
+                <a:spcPts val="0"/>
+              </a:spcAft>
+              <a:buClr>
+                <a:srgbClr val="000000"/>
+              </a:buClr>
+              <a:buSzPts val="1200"/>
+              <a:buFont typeface="Arial"/>
+              <a:buNone/>
+            </a:pPr>
+            <a:r>
+              <a:rPr lang="en-US" sz="1200" b="0" i="0" u="none" strike="noStrike" cap="none" dirty="0" smtClean="0">
+                <a:solidFill>
+                  <a:schemeClr val="dk1"/>
+                </a:solidFill>
+                <a:latin typeface="Arial" panose="020B0604020202020204" pitchFamily="34" charset="0"/>
+                <a:cs typeface="Arial" panose="020B0604020202020204" pitchFamily="34" charset="0"/>
+                <a:sym typeface="Arial"/>
+              </a:rPr>
+              <a:t>Vulnerability</a:t>
+            </a:r>
+            <a:endParaRPr sz="1400" b="0" i="0" u="none" strike="noStrike" cap="none" dirty="0">
+              <a:solidFill>
+                <a:srgbClr val="000000"/>
+              </a:solidFill>
+              <a:latin typeface="Arial" panose="020B0604020202020204" pitchFamily="34" charset="0"/>
+              <a:cs typeface="Arial" panose="020B0604020202020204" pitchFamily="34" charset="0"/>
+              <a:sym typeface="Arial"/>
+            </a:endParaRPr>
           </a:p>
         </p:txBody>
       </p:sp>

</xml_diff>

<commit_message>
[docs] update phase2 document for review
update phase2 document for review
</commit_message>
<xml_diff>
--- a/docs/phase2/03_vulnerabilities/vulnerabilities.pptx
+++ b/docs/phase2/03_vulnerabilities/vulnerabilities.pptx
@@ -5234,7 +5234,7 @@
           <p:cNvPr id="46" name="Google Shape;214;p55">
             <a:extLst>
               <a:ext uri="{FF2B5EF4-FFF2-40B4-BE49-F238E27FC236}">
-                <a16:creationId xmlns="" xmlns:a16="http://schemas.microsoft.com/office/drawing/2014/main" id="{DFFA0191-9961-4516-859A-604700977967}"/>
+                <a16:creationId xmlns:a16="http://schemas.microsoft.com/office/drawing/2014/main" xmlns="" id="{DFFA0191-9961-4516-859A-604700977967}"/>
               </a:ext>
             </a:extLst>
           </p:cNvPr>
@@ -5316,7 +5316,7 @@
           <p:cNvPr id="47" name="Google Shape;233;p55">
             <a:extLst>
               <a:ext uri="{FF2B5EF4-FFF2-40B4-BE49-F238E27FC236}">
-                <a16:creationId xmlns="" xmlns:a16="http://schemas.microsoft.com/office/drawing/2014/main" id="{08CF8F02-18B1-4A1B-8B92-8E56F353534D}"/>
+                <a16:creationId xmlns:a16="http://schemas.microsoft.com/office/drawing/2014/main" xmlns="" id="{08CF8F02-18B1-4A1B-8B92-8E56F353534D}"/>
               </a:ext>
             </a:extLst>
           </p:cNvPr>
@@ -5348,7 +5348,7 @@
           <p:cNvPr id="48" name="Google Shape;219;p55">
             <a:extLst>
               <a:ext uri="{FF2B5EF4-FFF2-40B4-BE49-F238E27FC236}">
-                <a16:creationId xmlns="" xmlns:a16="http://schemas.microsoft.com/office/drawing/2014/main" id="{FB8D6E94-6508-4EDE-9C03-75702AA75FDE}"/>
+                <a16:creationId xmlns:a16="http://schemas.microsoft.com/office/drawing/2014/main" xmlns="" id="{FB8D6E94-6508-4EDE-9C03-75702AA75FDE}"/>
               </a:ext>
             </a:extLst>
           </p:cNvPr>
@@ -7668,7 +7668,7 @@
           <p:cNvPr id="46" name="Google Shape;214;p55">
             <a:extLst>
               <a:ext uri="{FF2B5EF4-FFF2-40B4-BE49-F238E27FC236}">
-                <a16:creationId xmlns="" xmlns:a16="http://schemas.microsoft.com/office/drawing/2014/main" id="{DFFA0191-9961-4516-859A-604700977967}"/>
+                <a16:creationId xmlns:a16="http://schemas.microsoft.com/office/drawing/2014/main" xmlns="" id="{DFFA0191-9961-4516-859A-604700977967}"/>
               </a:ext>
             </a:extLst>
           </p:cNvPr>
@@ -7750,7 +7750,7 @@
           <p:cNvPr id="47" name="Google Shape;233;p55">
             <a:extLst>
               <a:ext uri="{FF2B5EF4-FFF2-40B4-BE49-F238E27FC236}">
-                <a16:creationId xmlns="" xmlns:a16="http://schemas.microsoft.com/office/drawing/2014/main" id="{08CF8F02-18B1-4A1B-8B92-8E56F353534D}"/>
+                <a16:creationId xmlns:a16="http://schemas.microsoft.com/office/drawing/2014/main" xmlns="" id="{08CF8F02-18B1-4A1B-8B92-8E56F353534D}"/>
               </a:ext>
             </a:extLst>
           </p:cNvPr>
@@ -7782,7 +7782,7 @@
           <p:cNvPr id="48" name="Google Shape;219;p55">
             <a:extLst>
               <a:ext uri="{FF2B5EF4-FFF2-40B4-BE49-F238E27FC236}">
-                <a16:creationId xmlns="" xmlns:a16="http://schemas.microsoft.com/office/drawing/2014/main" id="{FB8D6E94-6508-4EDE-9C03-75702AA75FDE}"/>
+                <a16:creationId xmlns:a16="http://schemas.microsoft.com/office/drawing/2014/main" xmlns="" id="{FB8D6E94-6508-4EDE-9C03-75702AA75FDE}"/>
               </a:ext>
             </a:extLst>
           </p:cNvPr>
@@ -7814,7 +7814,7 @@
           <p:cNvPr id="51" name="타원 50">
             <a:extLst>
               <a:ext uri="{FF2B5EF4-FFF2-40B4-BE49-F238E27FC236}">
-                <a16:creationId xmlns="" xmlns:a16="http://schemas.microsoft.com/office/drawing/2014/main" id="{8F2D1BDA-23B8-4349-8984-BE1B4BD4CD68}"/>
+                <a16:creationId xmlns:a16="http://schemas.microsoft.com/office/drawing/2014/main" xmlns="" id="{8F2D1BDA-23B8-4349-8984-BE1B4BD4CD68}"/>
               </a:ext>
             </a:extLst>
           </p:cNvPr>
@@ -7882,7 +7882,7 @@
           <p:cNvPr id="52" name="타원 51">
             <a:extLst>
               <a:ext uri="{FF2B5EF4-FFF2-40B4-BE49-F238E27FC236}">
-                <a16:creationId xmlns="" xmlns:a16="http://schemas.microsoft.com/office/drawing/2014/main" id="{214527EA-3F5E-4A77-AA8B-A562C5B0F6C2}"/>
+                <a16:creationId xmlns:a16="http://schemas.microsoft.com/office/drawing/2014/main" xmlns="" id="{214527EA-3F5E-4A77-AA8B-A562C5B0F6C2}"/>
               </a:ext>
             </a:extLst>
           </p:cNvPr>
@@ -7950,7 +7950,7 @@
           <p:cNvPr id="53" name="타원 52">
             <a:extLst>
               <a:ext uri="{FF2B5EF4-FFF2-40B4-BE49-F238E27FC236}">
-                <a16:creationId xmlns="" xmlns:a16="http://schemas.microsoft.com/office/drawing/2014/main" id="{BD37F2FA-E8CD-47F0-B041-42281CBBD1D5}"/>
+                <a16:creationId xmlns:a16="http://schemas.microsoft.com/office/drawing/2014/main" xmlns="" id="{BD37F2FA-E8CD-47F0-B041-42281CBBD1D5}"/>
               </a:ext>
             </a:extLst>
           </p:cNvPr>
@@ -8018,7 +8018,7 @@
           <p:cNvPr id="54" name="타원 53">
             <a:extLst>
               <a:ext uri="{FF2B5EF4-FFF2-40B4-BE49-F238E27FC236}">
-                <a16:creationId xmlns="" xmlns:a16="http://schemas.microsoft.com/office/drawing/2014/main" id="{AFCD2F96-5CAE-4D55-9CC1-0C2A73C51C9D}"/>
+                <a16:creationId xmlns:a16="http://schemas.microsoft.com/office/drawing/2014/main" xmlns="" id="{AFCD2F96-5CAE-4D55-9CC1-0C2A73C51C9D}"/>
               </a:ext>
             </a:extLst>
           </p:cNvPr>
@@ -8086,7 +8086,7 @@
           <p:cNvPr id="57" name="타원 56">
             <a:extLst>
               <a:ext uri="{FF2B5EF4-FFF2-40B4-BE49-F238E27FC236}">
-                <a16:creationId xmlns="" xmlns:a16="http://schemas.microsoft.com/office/drawing/2014/main" id="{79C1EAE1-FF6A-457D-B34B-58B6205BD145}"/>
+                <a16:creationId xmlns:a16="http://schemas.microsoft.com/office/drawing/2014/main" xmlns="" id="{79C1EAE1-FF6A-457D-B34B-58B6205BD145}"/>
               </a:ext>
             </a:extLst>
           </p:cNvPr>
@@ -8154,7 +8154,7 @@
           <p:cNvPr id="58" name="타원 57">
             <a:extLst>
               <a:ext uri="{FF2B5EF4-FFF2-40B4-BE49-F238E27FC236}">
-                <a16:creationId xmlns="" xmlns:a16="http://schemas.microsoft.com/office/drawing/2014/main" id="{D3BF1A94-9942-40EE-9FC7-1FC2D6573A24}"/>
+                <a16:creationId xmlns:a16="http://schemas.microsoft.com/office/drawing/2014/main" xmlns="" id="{D3BF1A94-9942-40EE-9FC7-1FC2D6573A24}"/>
               </a:ext>
             </a:extLst>
           </p:cNvPr>
@@ -8222,7 +8222,7 @@
           <p:cNvPr id="59" name="타원 58">
             <a:extLst>
               <a:ext uri="{FF2B5EF4-FFF2-40B4-BE49-F238E27FC236}">
-                <a16:creationId xmlns="" xmlns:a16="http://schemas.microsoft.com/office/drawing/2014/main" id="{290C5C0B-6FF7-47DE-AA13-1D7BA72EEACD}"/>
+                <a16:creationId xmlns:a16="http://schemas.microsoft.com/office/drawing/2014/main" xmlns="" id="{290C5C0B-6FF7-47DE-AA13-1D7BA72EEACD}"/>
               </a:ext>
             </a:extLst>
           </p:cNvPr>
@@ -8290,7 +8290,7 @@
           <p:cNvPr id="60" name="타원 59">
             <a:extLst>
               <a:ext uri="{FF2B5EF4-FFF2-40B4-BE49-F238E27FC236}">
-                <a16:creationId xmlns="" xmlns:a16="http://schemas.microsoft.com/office/drawing/2014/main" id="{C88302A2-9351-4F02-B76E-00161A78BDBA}"/>
+                <a16:creationId xmlns:a16="http://schemas.microsoft.com/office/drawing/2014/main" xmlns="" id="{C88302A2-9351-4F02-B76E-00161A78BDBA}"/>
               </a:ext>
             </a:extLst>
           </p:cNvPr>
@@ -8358,7 +8358,7 @@
           <p:cNvPr id="61" name="타원 60">
             <a:extLst>
               <a:ext uri="{FF2B5EF4-FFF2-40B4-BE49-F238E27FC236}">
-                <a16:creationId xmlns="" xmlns:a16="http://schemas.microsoft.com/office/drawing/2014/main" id="{AF6CE26B-897D-48B0-B910-084056A7C677}"/>
+                <a16:creationId xmlns:a16="http://schemas.microsoft.com/office/drawing/2014/main" xmlns="" id="{AF6CE26B-897D-48B0-B910-084056A7C677}"/>
               </a:ext>
             </a:extLst>
           </p:cNvPr>
@@ -8426,7 +8426,7 @@
           <p:cNvPr id="63" name="타원 62">
             <a:extLst>
               <a:ext uri="{FF2B5EF4-FFF2-40B4-BE49-F238E27FC236}">
-                <a16:creationId xmlns="" xmlns:a16="http://schemas.microsoft.com/office/drawing/2014/main" id="{2176C940-B3F5-4781-A426-FE55D18A29BD}"/>
+                <a16:creationId xmlns:a16="http://schemas.microsoft.com/office/drawing/2014/main" xmlns="" id="{2176C940-B3F5-4781-A426-FE55D18A29BD}"/>
               </a:ext>
             </a:extLst>
           </p:cNvPr>
@@ -8494,7 +8494,7 @@
           <p:cNvPr id="64" name="타원 63">
             <a:extLst>
               <a:ext uri="{FF2B5EF4-FFF2-40B4-BE49-F238E27FC236}">
-                <a16:creationId xmlns="" xmlns:a16="http://schemas.microsoft.com/office/drawing/2014/main" id="{7CE5C7E7-6196-4919-9E26-F786109572D0}"/>
+                <a16:creationId xmlns:a16="http://schemas.microsoft.com/office/drawing/2014/main" xmlns="" id="{7CE5C7E7-6196-4919-9E26-F786109572D0}"/>
               </a:ext>
             </a:extLst>
           </p:cNvPr>
@@ -8562,7 +8562,7 @@
           <p:cNvPr id="65" name="타원 64">
             <a:extLst>
               <a:ext uri="{FF2B5EF4-FFF2-40B4-BE49-F238E27FC236}">
-                <a16:creationId xmlns="" xmlns:a16="http://schemas.microsoft.com/office/drawing/2014/main" id="{1413D02F-4376-472C-B5B6-9D3FAE116D98}"/>
+                <a16:creationId xmlns:a16="http://schemas.microsoft.com/office/drawing/2014/main" xmlns="" id="{1413D02F-4376-472C-B5B6-9D3FAE116D98}"/>
               </a:ext>
             </a:extLst>
           </p:cNvPr>
@@ -10918,7 +10918,7 @@
           <p:cNvPr id="46" name="Google Shape;214;p55">
             <a:extLst>
               <a:ext uri="{FF2B5EF4-FFF2-40B4-BE49-F238E27FC236}">
-                <a16:creationId xmlns="" xmlns:a16="http://schemas.microsoft.com/office/drawing/2014/main" id="{DFFA0191-9961-4516-859A-604700977967}"/>
+                <a16:creationId xmlns:a16="http://schemas.microsoft.com/office/drawing/2014/main" xmlns="" id="{DFFA0191-9961-4516-859A-604700977967}"/>
               </a:ext>
             </a:extLst>
           </p:cNvPr>
@@ -11000,7 +11000,7 @@
           <p:cNvPr id="47" name="Google Shape;233;p55">
             <a:extLst>
               <a:ext uri="{FF2B5EF4-FFF2-40B4-BE49-F238E27FC236}">
-                <a16:creationId xmlns="" xmlns:a16="http://schemas.microsoft.com/office/drawing/2014/main" id="{08CF8F02-18B1-4A1B-8B92-8E56F353534D}"/>
+                <a16:creationId xmlns:a16="http://schemas.microsoft.com/office/drawing/2014/main" xmlns="" id="{08CF8F02-18B1-4A1B-8B92-8E56F353534D}"/>
               </a:ext>
             </a:extLst>
           </p:cNvPr>
@@ -11032,7 +11032,7 @@
           <p:cNvPr id="48" name="Google Shape;219;p55">
             <a:extLst>
               <a:ext uri="{FF2B5EF4-FFF2-40B4-BE49-F238E27FC236}">
-                <a16:creationId xmlns="" xmlns:a16="http://schemas.microsoft.com/office/drawing/2014/main" id="{FB8D6E94-6508-4EDE-9C03-75702AA75FDE}"/>
+                <a16:creationId xmlns:a16="http://schemas.microsoft.com/office/drawing/2014/main" xmlns="" id="{FB8D6E94-6508-4EDE-9C03-75702AA75FDE}"/>
               </a:ext>
             </a:extLst>
           </p:cNvPr>
@@ -11064,7 +11064,7 @@
           <p:cNvPr id="51" name="타원 50">
             <a:extLst>
               <a:ext uri="{FF2B5EF4-FFF2-40B4-BE49-F238E27FC236}">
-                <a16:creationId xmlns="" xmlns:a16="http://schemas.microsoft.com/office/drawing/2014/main" id="{8F2D1BDA-23B8-4349-8984-BE1B4BD4CD68}"/>
+                <a16:creationId xmlns:a16="http://schemas.microsoft.com/office/drawing/2014/main" xmlns="" id="{8F2D1BDA-23B8-4349-8984-BE1B4BD4CD68}"/>
               </a:ext>
             </a:extLst>
           </p:cNvPr>
@@ -11132,7 +11132,7 @@
           <p:cNvPr id="52" name="타원 51">
             <a:extLst>
               <a:ext uri="{FF2B5EF4-FFF2-40B4-BE49-F238E27FC236}">
-                <a16:creationId xmlns="" xmlns:a16="http://schemas.microsoft.com/office/drawing/2014/main" id="{214527EA-3F5E-4A77-AA8B-A562C5B0F6C2}"/>
+                <a16:creationId xmlns:a16="http://schemas.microsoft.com/office/drawing/2014/main" xmlns="" id="{214527EA-3F5E-4A77-AA8B-A562C5B0F6C2}"/>
               </a:ext>
             </a:extLst>
           </p:cNvPr>
@@ -11200,7 +11200,7 @@
           <p:cNvPr id="53" name="타원 52">
             <a:extLst>
               <a:ext uri="{FF2B5EF4-FFF2-40B4-BE49-F238E27FC236}">
-                <a16:creationId xmlns="" xmlns:a16="http://schemas.microsoft.com/office/drawing/2014/main" id="{BD37F2FA-E8CD-47F0-B041-42281CBBD1D5}"/>
+                <a16:creationId xmlns:a16="http://schemas.microsoft.com/office/drawing/2014/main" xmlns="" id="{BD37F2FA-E8CD-47F0-B041-42281CBBD1D5}"/>
               </a:ext>
             </a:extLst>
           </p:cNvPr>
@@ -11268,7 +11268,7 @@
           <p:cNvPr id="54" name="타원 53">
             <a:extLst>
               <a:ext uri="{FF2B5EF4-FFF2-40B4-BE49-F238E27FC236}">
-                <a16:creationId xmlns="" xmlns:a16="http://schemas.microsoft.com/office/drawing/2014/main" id="{AFCD2F96-5CAE-4D55-9CC1-0C2A73C51C9D}"/>
+                <a16:creationId xmlns:a16="http://schemas.microsoft.com/office/drawing/2014/main" xmlns="" id="{AFCD2F96-5CAE-4D55-9CC1-0C2A73C51C9D}"/>
               </a:ext>
             </a:extLst>
           </p:cNvPr>
@@ -11336,7 +11336,7 @@
           <p:cNvPr id="55" name="타원 54">
             <a:extLst>
               <a:ext uri="{FF2B5EF4-FFF2-40B4-BE49-F238E27FC236}">
-                <a16:creationId xmlns="" xmlns:a16="http://schemas.microsoft.com/office/drawing/2014/main" id="{7CE5C7E7-6196-4919-9E26-F786109572D0}"/>
+                <a16:creationId xmlns:a16="http://schemas.microsoft.com/office/drawing/2014/main" xmlns="" id="{7CE5C7E7-6196-4919-9E26-F786109572D0}"/>
               </a:ext>
             </a:extLst>
           </p:cNvPr>
@@ -11404,7 +11404,7 @@
           <p:cNvPr id="56" name="타원 55">
             <a:extLst>
               <a:ext uri="{FF2B5EF4-FFF2-40B4-BE49-F238E27FC236}">
-                <a16:creationId xmlns="" xmlns:a16="http://schemas.microsoft.com/office/drawing/2014/main" id="{1413D02F-4376-472C-B5B6-9D3FAE116D98}"/>
+                <a16:creationId xmlns:a16="http://schemas.microsoft.com/office/drawing/2014/main" xmlns="" id="{1413D02F-4376-472C-B5B6-9D3FAE116D98}"/>
               </a:ext>
             </a:extLst>
           </p:cNvPr>
@@ -11472,7 +11472,7 @@
           <p:cNvPr id="57" name="타원 56">
             <a:extLst>
               <a:ext uri="{FF2B5EF4-FFF2-40B4-BE49-F238E27FC236}">
-                <a16:creationId xmlns="" xmlns:a16="http://schemas.microsoft.com/office/drawing/2014/main" id="{79C1EAE1-FF6A-457D-B34B-58B6205BD145}"/>
+                <a16:creationId xmlns:a16="http://schemas.microsoft.com/office/drawing/2014/main" xmlns="" id="{79C1EAE1-FF6A-457D-B34B-58B6205BD145}"/>
               </a:ext>
             </a:extLst>
           </p:cNvPr>
@@ -11540,7 +11540,7 @@
           <p:cNvPr id="58" name="타원 57">
             <a:extLst>
               <a:ext uri="{FF2B5EF4-FFF2-40B4-BE49-F238E27FC236}">
-                <a16:creationId xmlns="" xmlns:a16="http://schemas.microsoft.com/office/drawing/2014/main" id="{D3BF1A94-9942-40EE-9FC7-1FC2D6573A24}"/>
+                <a16:creationId xmlns:a16="http://schemas.microsoft.com/office/drawing/2014/main" xmlns="" id="{D3BF1A94-9942-40EE-9FC7-1FC2D6573A24}"/>
               </a:ext>
             </a:extLst>
           </p:cNvPr>
@@ -11608,7 +11608,7 @@
           <p:cNvPr id="59" name="타원 58">
             <a:extLst>
               <a:ext uri="{FF2B5EF4-FFF2-40B4-BE49-F238E27FC236}">
-                <a16:creationId xmlns="" xmlns:a16="http://schemas.microsoft.com/office/drawing/2014/main" id="{290C5C0B-6FF7-47DE-AA13-1D7BA72EEACD}"/>
+                <a16:creationId xmlns:a16="http://schemas.microsoft.com/office/drawing/2014/main" xmlns="" id="{290C5C0B-6FF7-47DE-AA13-1D7BA72EEACD}"/>
               </a:ext>
             </a:extLst>
           </p:cNvPr>
@@ -11676,7 +11676,7 @@
           <p:cNvPr id="60" name="타원 59">
             <a:extLst>
               <a:ext uri="{FF2B5EF4-FFF2-40B4-BE49-F238E27FC236}">
-                <a16:creationId xmlns="" xmlns:a16="http://schemas.microsoft.com/office/drawing/2014/main" id="{C88302A2-9351-4F02-B76E-00161A78BDBA}"/>
+                <a16:creationId xmlns:a16="http://schemas.microsoft.com/office/drawing/2014/main" xmlns="" id="{C88302A2-9351-4F02-B76E-00161A78BDBA}"/>
               </a:ext>
             </a:extLst>
           </p:cNvPr>
@@ -11744,7 +11744,7 @@
           <p:cNvPr id="61" name="타원 60">
             <a:extLst>
               <a:ext uri="{FF2B5EF4-FFF2-40B4-BE49-F238E27FC236}">
-                <a16:creationId xmlns="" xmlns:a16="http://schemas.microsoft.com/office/drawing/2014/main" id="{AF6CE26B-897D-48B0-B910-084056A7C677}"/>
+                <a16:creationId xmlns:a16="http://schemas.microsoft.com/office/drawing/2014/main" xmlns="" id="{AF6CE26B-897D-48B0-B910-084056A7C677}"/>
               </a:ext>
             </a:extLst>
           </p:cNvPr>
@@ -11812,7 +11812,7 @@
           <p:cNvPr id="62" name="타원 61">
             <a:extLst>
               <a:ext uri="{FF2B5EF4-FFF2-40B4-BE49-F238E27FC236}">
-                <a16:creationId xmlns="" xmlns:a16="http://schemas.microsoft.com/office/drawing/2014/main" id="{2176C940-B3F5-4781-A426-FE55D18A29BD}"/>
+                <a16:creationId xmlns:a16="http://schemas.microsoft.com/office/drawing/2014/main" xmlns="" id="{2176C940-B3F5-4781-A426-FE55D18A29BD}"/>
               </a:ext>
             </a:extLst>
           </p:cNvPr>
@@ -12141,8 +12141,8 @@
         </p:nvSpPr>
         <p:spPr>
           <a:xfrm>
-            <a:off x="4527509" y="4364347"/>
-            <a:ext cx="788568" cy="811188"/>
+            <a:off x="4563761" y="4380869"/>
+            <a:ext cx="752315" cy="794666"/>
           </a:xfrm>
           <a:prstGeom prst="irregularSeal1">
             <a:avLst/>
@@ -12188,8 +12188,8 @@
         </p:nvSpPr>
         <p:spPr>
           <a:xfrm>
-            <a:off x="2846626" y="2967398"/>
-            <a:ext cx="780110" cy="813018"/>
+            <a:off x="2800497" y="3022433"/>
+            <a:ext cx="747330" cy="738437"/>
           </a:xfrm>
           <a:prstGeom prst="irregularSeal1">
             <a:avLst/>
@@ -12235,8 +12235,8 @@
         </p:nvSpPr>
         <p:spPr>
           <a:xfrm>
-            <a:off x="4418199" y="2640816"/>
-            <a:ext cx="817147" cy="835885"/>
+            <a:off x="4106914" y="2607354"/>
+            <a:ext cx="1225042" cy="899988"/>
           </a:xfrm>
           <a:prstGeom prst="irregularSeal1">
             <a:avLst/>
@@ -12268,21 +12268,22 @@
             <a:pPr algn="ctr"/>
             <a:r>
               <a:rPr lang="en-US" altLang="ko-KR" sz="1000" b="1" dirty="0" smtClean="0"/>
-              <a:t>V04</a:t>
-            </a:r>
+              <a:t>V04,V05</a:t>
+            </a:r>
+            <a:endParaRPr lang="en-US" altLang="ko-KR" sz="1000" b="1" dirty="0" smtClean="0"/>
           </a:p>
           <a:p>
             <a:pPr algn="ctr"/>
             <a:r>
               <a:rPr lang="en-US" altLang="ko-KR" sz="1000" b="1" dirty="0" smtClean="0"/>
-              <a:t>V05</a:t>
+              <a:t>V08,V10</a:t>
             </a:r>
           </a:p>
           <a:p>
             <a:pPr algn="ctr"/>
             <a:r>
               <a:rPr lang="en-US" altLang="ko-KR" sz="1000" b="1" dirty="0" smtClean="0"/>
-              <a:t>V08</a:t>
+              <a:t>V12</a:t>
             </a:r>
             <a:endParaRPr lang="ko-KR" altLang="en-US" sz="1000" b="1" dirty="0"/>
           </a:p>
@@ -12296,8 +12297,8 @@
         </p:nvSpPr>
         <p:spPr>
           <a:xfrm>
-            <a:off x="6634185" y="2689872"/>
-            <a:ext cx="763552" cy="811188"/>
+            <a:off x="6627073" y="2743832"/>
+            <a:ext cx="770664" cy="757228"/>
           </a:xfrm>
           <a:prstGeom prst="irregularSeal1">
             <a:avLst/>
@@ -12378,6 +12379,13 @@
               <a:rPr lang="en-US" altLang="ko-KR" sz="1000" b="1" dirty="0" smtClean="0"/>
               <a:t>V06</a:t>
             </a:r>
+          </a:p>
+          <a:p>
+            <a:pPr algn="ctr"/>
+            <a:r>
+              <a:rPr lang="en-US" altLang="ko-KR" sz="1000" b="1" dirty="0" smtClean="0"/>
+              <a:t>V11</a:t>
+            </a:r>
             <a:endParaRPr lang="ko-KR" altLang="en-US" sz="1000" b="1" dirty="0"/>
           </a:p>
         </p:txBody>
@@ -12486,6 +12494,53 @@
               <a:cs typeface="Arial" panose="020B0604020202020204" pitchFamily="34" charset="0"/>
               <a:sym typeface="Arial"/>
             </a:endParaRPr>
+          </a:p>
+        </p:txBody>
+      </p:sp>
+      <p:sp>
+        <p:nvSpPr>
+          <p:cNvPr id="70" name="폭발 1 69"/>
+          <p:cNvSpPr/>
+          <p:nvPr/>
+        </p:nvSpPr>
+        <p:spPr>
+          <a:xfrm>
+            <a:off x="4336972" y="3491234"/>
+            <a:ext cx="753606" cy="770617"/>
+          </a:xfrm>
+          <a:prstGeom prst="irregularSeal1">
+            <a:avLst/>
+          </a:prstGeom>
+          <a:solidFill>
+            <a:srgbClr val="FF0000"/>
+          </a:solidFill>
+        </p:spPr>
+        <p:style>
+          <a:lnRef idx="2">
+            <a:schemeClr val="accent1">
+              <a:shade val="50000"/>
+            </a:schemeClr>
+          </a:lnRef>
+          <a:fillRef idx="1">
+            <a:schemeClr val="accent1"/>
+          </a:fillRef>
+          <a:effectRef idx="0">
+            <a:schemeClr val="accent1"/>
+          </a:effectRef>
+          <a:fontRef idx="minor">
+            <a:schemeClr val="lt1"/>
+          </a:fontRef>
+        </p:style>
+        <p:txBody>
+          <a:bodyPr rtlCol="0" anchor="ctr"/>
+          <a:lstStyle/>
+          <a:p>
+            <a:pPr algn="ctr"/>
+            <a:r>
+              <a:rPr lang="en-US" altLang="ko-KR" sz="1000" b="1" dirty="0" smtClean="0"/>
+              <a:t>V11</a:t>
+            </a:r>
+            <a:endParaRPr lang="ko-KR" altLang="en-US" sz="1000" b="1" dirty="0"/>
           </a:p>
         </p:txBody>
       </p:sp>

</xml_diff>